<commit_message>
fix lỗi thêm sản phẩm
</commit_message>
<xml_diff>
--- a/Nhom9.pptx
+++ b/Nhom9.pptx
@@ -5,7 +5,7 @@
     <p:sldMasterId id="2147483677" r:id="rId1"/>
   </p:sldMasterIdLst>
   <p:notesMasterIdLst>
-    <p:notesMasterId r:id="rId24"/>
+    <p:notesMasterId r:id="rId27"/>
   </p:notesMasterIdLst>
   <p:sldIdLst>
     <p:sldId id="256" r:id="rId2"/>
@@ -25,11 +25,14 @@
     <p:sldId id="265" r:id="rId16"/>
     <p:sldId id="275" r:id="rId17"/>
     <p:sldId id="276" r:id="rId18"/>
-    <p:sldId id="277" r:id="rId19"/>
-    <p:sldId id="264" r:id="rId20"/>
-    <p:sldId id="269" r:id="rId21"/>
-    <p:sldId id="278" r:id="rId22"/>
-    <p:sldId id="279" r:id="rId23"/>
+    <p:sldId id="280" r:id="rId19"/>
+    <p:sldId id="281" r:id="rId20"/>
+    <p:sldId id="282" r:id="rId21"/>
+    <p:sldId id="277" r:id="rId22"/>
+    <p:sldId id="264" r:id="rId23"/>
+    <p:sldId id="269" r:id="rId24"/>
+    <p:sldId id="278" r:id="rId25"/>
+    <p:sldId id="279" r:id="rId26"/>
   </p:sldIdLst>
   <p:sldSz cx="12192000" cy="6858000"/>
   <p:notesSz cx="6858000" cy="9144000"/>
@@ -148,20 +151,6 @@
 </p:cmAuthorLst>
 </file>
 
-<file path=ppt/comments/comment1.xml><?xml version="1.0" encoding="utf-8"?>
-<p:cmLst xmlns:a="http://schemas.openxmlformats.org/drawingml/2006/main" xmlns:r="http://schemas.openxmlformats.org/officeDocument/2006/relationships" xmlns:p="http://schemas.openxmlformats.org/presentationml/2006/main">
-  <p:cm authorId="1" dt="2020-08-06T21:58:28.478" idx="1">
-    <p:pos x="1804" y="1023"/>
-    <p:text/>
-    <p:extLst>
-      <p:ext uri="{C676402C-5697-4E1C-873F-D02D1690AC5C}">
-        <p15:threadingInfo xmlns:p15="http://schemas.microsoft.com/office/powerpoint/2012/main" timeZoneBias="-420"/>
-      </p:ext>
-    </p:extLst>
-  </p:cm>
-</p:cmLst>
-</file>
-
 <file path=ppt/notesMasters/notesMaster1.xml><?xml version="1.0" encoding="utf-8"?>
 <p:notesMaster xmlns:a="http://schemas.openxmlformats.org/drawingml/2006/main" xmlns:r="http://schemas.openxmlformats.org/officeDocument/2006/relationships" xmlns:p="http://schemas.openxmlformats.org/presentationml/2006/main">
   <p:cSld>
@@ -244,7 +233,7 @@
           <a:p>
             <a:fld id="{9734D3E7-8129-4A7B-BAE7-90872EFA5441}" type="datetimeFigureOut">
               <a:rPr lang="en-US" smtClean="0"/>
-              <a:t>8/6/2020</a:t>
+              <a:t>8/7/2020</a:t>
             </a:fld>
             <a:endParaRPr lang="en-US"/>
           </a:p>
@@ -577,7 +566,7 @@
           <a:p>
             <a:fld id="{BF1CA50C-EF76-4446-B6FE-6D7D5BD297E4}" type="slidenum">
               <a:rPr lang="en-US" smtClean="0"/>
-              <a:t>22</a:t>
+              <a:t>25</a:t>
             </a:fld>
             <a:endParaRPr lang="en-US"/>
           </a:p>
@@ -787,7 +776,7 @@
           <a:p>
             <a:fld id="{D0B6EAA0-EE4A-47D3-BBE3-B6748B6FF586}" type="datetimeFigureOut">
               <a:rPr lang="en-US" smtClean="0"/>
-              <a:t>8/6/2020</a:t>
+              <a:t>8/7/2020</a:t>
             </a:fld>
             <a:endParaRPr lang="en-US"/>
           </a:p>
@@ -1223,7 +1212,7 @@
           <a:p>
             <a:fld id="{D0B6EAA0-EE4A-47D3-BBE3-B6748B6FF586}" type="datetimeFigureOut">
               <a:rPr lang="en-US" smtClean="0"/>
-              <a:t>8/6/2020</a:t>
+              <a:t>8/7/2020</a:t>
             </a:fld>
             <a:endParaRPr lang="en-US"/>
           </a:p>
@@ -1473,7 +1462,7 @@
           <a:p>
             <a:fld id="{D0B6EAA0-EE4A-47D3-BBE3-B6748B6FF586}" type="datetimeFigureOut">
               <a:rPr lang="en-US" smtClean="0"/>
-              <a:t>8/6/2020</a:t>
+              <a:t>8/7/2020</a:t>
             </a:fld>
             <a:endParaRPr lang="en-US"/>
           </a:p>
@@ -1781,7 +1770,7 @@
           <a:p>
             <a:fld id="{D0B6EAA0-EE4A-47D3-BBE3-B6748B6FF586}" type="datetimeFigureOut">
               <a:rPr lang="en-US" smtClean="0"/>
-              <a:t>8/6/2020</a:t>
+              <a:t>8/7/2020</a:t>
             </a:fld>
             <a:endParaRPr lang="en-US"/>
           </a:p>
@@ -2099,7 +2088,7 @@
           <a:p>
             <a:fld id="{D0B6EAA0-EE4A-47D3-BBE3-B6748B6FF586}" type="datetimeFigureOut">
               <a:rPr lang="en-US" smtClean="0"/>
-              <a:t>8/6/2020</a:t>
+              <a:t>8/7/2020</a:t>
             </a:fld>
             <a:endParaRPr lang="en-US"/>
           </a:p>
@@ -2401,7 +2390,7 @@
           <a:p>
             <a:fld id="{D0B6EAA0-EE4A-47D3-BBE3-B6748B6FF586}" type="datetimeFigureOut">
               <a:rPr lang="en-US" smtClean="0"/>
-              <a:t>8/6/2020</a:t>
+              <a:t>8/7/2020</a:t>
             </a:fld>
             <a:endParaRPr lang="en-US"/>
           </a:p>
@@ -2768,7 +2757,7 @@
           <a:p>
             <a:fld id="{D0B6EAA0-EE4A-47D3-BBE3-B6748B6FF586}" type="datetimeFigureOut">
               <a:rPr lang="en-US" smtClean="0"/>
-              <a:t>8/6/2020</a:t>
+              <a:t>8/7/2020</a:t>
             </a:fld>
             <a:endParaRPr lang="en-US"/>
           </a:p>
@@ -2942,7 +2931,7 @@
           <a:p>
             <a:fld id="{D0B6EAA0-EE4A-47D3-BBE3-B6748B6FF586}" type="datetimeFigureOut">
               <a:rPr lang="en-US" smtClean="0"/>
-              <a:t>8/6/2020</a:t>
+              <a:t>8/7/2020</a:t>
             </a:fld>
             <a:endParaRPr lang="en-US"/>
           </a:p>
@@ -3122,7 +3111,7 @@
           <a:p>
             <a:fld id="{D0B6EAA0-EE4A-47D3-BBE3-B6748B6FF586}" type="datetimeFigureOut">
               <a:rPr lang="en-US" smtClean="0"/>
-              <a:t>8/6/2020</a:t>
+              <a:t>8/7/2020</a:t>
             </a:fld>
             <a:endParaRPr lang="en-US"/>
           </a:p>
@@ -3292,7 +3281,7 @@
           <a:p>
             <a:fld id="{D0B6EAA0-EE4A-47D3-BBE3-B6748B6FF586}" type="datetimeFigureOut">
               <a:rPr lang="en-US" smtClean="0"/>
-              <a:t>8/6/2020</a:t>
+              <a:t>8/7/2020</a:t>
             </a:fld>
             <a:endParaRPr lang="en-US"/>
           </a:p>
@@ -3542,7 +3531,7 @@
           <a:p>
             <a:fld id="{D0B6EAA0-EE4A-47D3-BBE3-B6748B6FF586}" type="datetimeFigureOut">
               <a:rPr lang="en-US" smtClean="0"/>
-              <a:t>8/6/2020</a:t>
+              <a:t>8/7/2020</a:t>
             </a:fld>
             <a:endParaRPr lang="en-US"/>
           </a:p>
@@ -3778,7 +3767,7 @@
           <a:p>
             <a:fld id="{D0B6EAA0-EE4A-47D3-BBE3-B6748B6FF586}" type="datetimeFigureOut">
               <a:rPr lang="en-US" smtClean="0"/>
-              <a:t>8/6/2020</a:t>
+              <a:t>8/7/2020</a:t>
             </a:fld>
             <a:endParaRPr lang="en-US"/>
           </a:p>
@@ -4160,7 +4149,7 @@
           <a:p>
             <a:fld id="{D0B6EAA0-EE4A-47D3-BBE3-B6748B6FF586}" type="datetimeFigureOut">
               <a:rPr lang="en-US" smtClean="0"/>
-              <a:t>8/6/2020</a:t>
+              <a:t>8/7/2020</a:t>
             </a:fld>
             <a:endParaRPr lang="en-US"/>
           </a:p>
@@ -4278,7 +4267,7 @@
           <a:p>
             <a:fld id="{D0B6EAA0-EE4A-47D3-BBE3-B6748B6FF586}" type="datetimeFigureOut">
               <a:rPr lang="en-US" smtClean="0"/>
-              <a:t>8/6/2020</a:t>
+              <a:t>8/7/2020</a:t>
             </a:fld>
             <a:endParaRPr lang="en-US"/>
           </a:p>
@@ -4373,7 +4362,7 @@
           <a:p>
             <a:fld id="{D0B6EAA0-EE4A-47D3-BBE3-B6748B6FF586}" type="datetimeFigureOut">
               <a:rPr lang="en-US" smtClean="0"/>
-              <a:t>8/6/2020</a:t>
+              <a:t>8/7/2020</a:t>
             </a:fld>
             <a:endParaRPr lang="en-US"/>
           </a:p>
@@ -4628,7 +4617,7 @@
           <a:p>
             <a:fld id="{D0B6EAA0-EE4A-47D3-BBE3-B6748B6FF586}" type="datetimeFigureOut">
               <a:rPr lang="en-US" smtClean="0"/>
-              <a:t>8/6/2020</a:t>
+              <a:t>8/7/2020</a:t>
             </a:fld>
             <a:endParaRPr lang="en-US"/>
           </a:p>
@@ -4911,7 +4900,7 @@
           <a:p>
             <a:fld id="{D0B6EAA0-EE4A-47D3-BBE3-B6748B6FF586}" type="datetimeFigureOut">
               <a:rPr lang="en-US" smtClean="0"/>
-              <a:t>8/6/2020</a:t>
+              <a:t>8/7/2020</a:t>
             </a:fld>
             <a:endParaRPr lang="en-US"/>
           </a:p>
@@ -5317,7 +5306,7 @@
           <a:p>
             <a:fld id="{D0B6EAA0-EE4A-47D3-BBE3-B6748B6FF586}" type="datetimeFigureOut">
               <a:rPr lang="en-US" smtClean="0"/>
-              <a:t>8/6/2020</a:t>
+              <a:t>8/7/2020</a:t>
             </a:fld>
             <a:endParaRPr lang="en-US"/>
           </a:p>
@@ -6166,17 +6155,7 @@
                 <a:latin typeface="Tw Cen MT" panose="020B0602020104020603" pitchFamily="34" charset="0"/>
                 <a:cs typeface="Times New Roman" panose="02020603050405020304" pitchFamily="18" charset="0"/>
               </a:rPr>
-              <a:t>Đề tài: </a:t>
-            </a:r>
-            <a:r>
-              <a:rPr lang="en-US" sz="6600" b="1" smtClean="0">
-                <a:solidFill>
-                  <a:srgbClr val="FFFF00"/>
-                </a:solidFill>
-                <a:latin typeface="Tw Cen MT" panose="020B0602020104020603" pitchFamily="34" charset="0"/>
-                <a:cs typeface="Times New Roman" panose="02020603050405020304" pitchFamily="18" charset="0"/>
-              </a:rPr>
-              <a:t>Quản </a:t>
+              <a:t>Đề tài: Quản </a:t>
             </a:r>
             <a:r>
               <a:rPr lang="en-US" sz="6600" b="1" err="1">
@@ -7207,7 +7186,7 @@
         <p:spPr>
           <a:xfrm>
             <a:off x="283029" y="1284514"/>
-            <a:ext cx="10287000" cy="3231654"/>
+            <a:ext cx="10287000" cy="3477875"/>
           </a:xfrm>
           <a:prstGeom prst="rect">
             <a:avLst/>
@@ -7225,35 +7204,59 @@
               <a:buChar char="Ø"/>
             </a:pPr>
             <a:r>
-              <a:rPr lang="en-US" dirty="0" err="1" smtClean="0"/>
+              <a:rPr lang="en-US" sz="2000" dirty="0" err="1" smtClean="0">
+                <a:latin typeface="Times New Roman" panose="02020603050405020304" pitchFamily="18" charset="0"/>
+                <a:cs typeface="Times New Roman" panose="02020603050405020304" pitchFamily="18" charset="0"/>
+              </a:rPr>
               <a:t>Triển</a:t>
             </a:r>
             <a:r>
-              <a:rPr lang="en-US" dirty="0" smtClean="0"/>
-              <a:t> </a:t>
-            </a:r>
-            <a:r>
-              <a:rPr lang="en-US" dirty="0" err="1" smtClean="0"/>
+              <a:rPr lang="en-US" sz="2000" dirty="0" smtClean="0">
+                <a:latin typeface="Times New Roman" panose="02020603050405020304" pitchFamily="18" charset="0"/>
+                <a:cs typeface="Times New Roman" panose="02020603050405020304" pitchFamily="18" charset="0"/>
+              </a:rPr>
+              <a:t> </a:t>
+            </a:r>
+            <a:r>
+              <a:rPr lang="en-US" sz="2000" dirty="0" err="1" smtClean="0">
+                <a:latin typeface="Times New Roman" panose="02020603050405020304" pitchFamily="18" charset="0"/>
+                <a:cs typeface="Times New Roman" panose="02020603050405020304" pitchFamily="18" charset="0"/>
+              </a:rPr>
               <a:t>Khai</a:t>
             </a:r>
             <a:r>
-              <a:rPr lang="en-US" dirty="0" smtClean="0"/>
-              <a:t> </a:t>
-            </a:r>
-            <a:r>
-              <a:rPr lang="en-US" dirty="0" err="1" smtClean="0"/>
+              <a:rPr lang="en-US" sz="2000" dirty="0" smtClean="0">
+                <a:latin typeface="Times New Roman" panose="02020603050405020304" pitchFamily="18" charset="0"/>
+                <a:cs typeface="Times New Roman" panose="02020603050405020304" pitchFamily="18" charset="0"/>
+              </a:rPr>
+              <a:t> </a:t>
+            </a:r>
+            <a:r>
+              <a:rPr lang="en-US" sz="2000" dirty="0" err="1" smtClean="0">
+                <a:latin typeface="Times New Roman" panose="02020603050405020304" pitchFamily="18" charset="0"/>
+                <a:cs typeface="Times New Roman" panose="02020603050405020304" pitchFamily="18" charset="0"/>
+              </a:rPr>
               <a:t>Phần</a:t>
             </a:r>
             <a:r>
-              <a:rPr lang="en-US" dirty="0" smtClean="0"/>
-              <a:t> </a:t>
-            </a:r>
-            <a:r>
-              <a:rPr lang="en-US" dirty="0" err="1" smtClean="0"/>
+              <a:rPr lang="en-US" sz="2000" dirty="0" smtClean="0">
+                <a:latin typeface="Times New Roman" panose="02020603050405020304" pitchFamily="18" charset="0"/>
+                <a:cs typeface="Times New Roman" panose="02020603050405020304" pitchFamily="18" charset="0"/>
+              </a:rPr>
+              <a:t> </a:t>
+            </a:r>
+            <a:r>
+              <a:rPr lang="en-US" sz="2000" dirty="0" err="1" smtClean="0">
+                <a:latin typeface="Times New Roman" panose="02020603050405020304" pitchFamily="18" charset="0"/>
+                <a:cs typeface="Times New Roman" panose="02020603050405020304" pitchFamily="18" charset="0"/>
+              </a:rPr>
               <a:t>Mềm</a:t>
             </a:r>
             <a:r>
-              <a:rPr lang="en-US" dirty="0" smtClean="0"/>
+              <a:rPr lang="en-US" sz="2000" dirty="0" smtClean="0">
+                <a:latin typeface="Times New Roman" panose="02020603050405020304" pitchFamily="18" charset="0"/>
+                <a:cs typeface="Times New Roman" panose="02020603050405020304" pitchFamily="18" charset="0"/>
+              </a:rPr>
               <a:t>:</a:t>
             </a:r>
           </a:p>
@@ -7299,7 +7302,10 @@
               <a:buFont typeface="Wingdings" panose="05000000000000000000" pitchFamily="2" charset="2"/>
               <a:buChar char="§"/>
             </a:pPr>
-            <a:endParaRPr lang="en-US" dirty="0" smtClean="0"/>
+            <a:endParaRPr lang="en-US" sz="2000" dirty="0" smtClean="0">
+              <a:latin typeface="Times New Roman" panose="02020603050405020304" pitchFamily="18" charset="0"/>
+              <a:cs typeface="Times New Roman" panose="02020603050405020304" pitchFamily="18" charset="0"/>
+            </a:endParaRPr>
           </a:p>
           <a:p>
             <a:pPr marL="285750" indent="-285750">
@@ -7307,19 +7313,31 @@
               <a:buChar char="Ø"/>
             </a:pPr>
             <a:r>
-              <a:rPr lang="en-US" dirty="0" err="1" smtClean="0"/>
+              <a:rPr lang="en-US" sz="2000" dirty="0" err="1" smtClean="0">
+                <a:latin typeface="Times New Roman" panose="02020603050405020304" pitchFamily="18" charset="0"/>
+                <a:cs typeface="Times New Roman" panose="02020603050405020304" pitchFamily="18" charset="0"/>
+              </a:rPr>
               <a:t>Liên</a:t>
             </a:r>
             <a:r>
-              <a:rPr lang="en-US" dirty="0" smtClean="0"/>
-              <a:t> </a:t>
-            </a:r>
-            <a:r>
-              <a:rPr lang="en-US" dirty="0" err="1" smtClean="0"/>
+              <a:rPr lang="en-US" sz="2000" dirty="0" smtClean="0">
+                <a:latin typeface="Times New Roman" panose="02020603050405020304" pitchFamily="18" charset="0"/>
+                <a:cs typeface="Times New Roman" panose="02020603050405020304" pitchFamily="18" charset="0"/>
+              </a:rPr>
+              <a:t> </a:t>
+            </a:r>
+            <a:r>
+              <a:rPr lang="en-US" sz="2000" dirty="0" err="1" smtClean="0">
+                <a:latin typeface="Times New Roman" panose="02020603050405020304" pitchFamily="18" charset="0"/>
+                <a:cs typeface="Times New Roman" panose="02020603050405020304" pitchFamily="18" charset="0"/>
+              </a:rPr>
               <a:t>Lạc</a:t>
             </a:r>
             <a:r>
-              <a:rPr lang="en-US" dirty="0" smtClean="0"/>
+              <a:rPr lang="en-US" sz="2000" dirty="0" smtClean="0">
+                <a:latin typeface="Times New Roman" panose="02020603050405020304" pitchFamily="18" charset="0"/>
+                <a:cs typeface="Times New Roman" panose="02020603050405020304" pitchFamily="18" charset="0"/>
+              </a:rPr>
               <a:t>:</a:t>
             </a:r>
           </a:p>
@@ -7329,10 +7347,16 @@
               <a:buChar char="§"/>
             </a:pPr>
             <a:r>
-              <a:rPr lang="en-US" dirty="0" err="1" smtClean="0"/>
+              <a:rPr lang="en-US" sz="2000" dirty="0" err="1" smtClean="0">
+                <a:latin typeface="Times New Roman" panose="02020603050405020304" pitchFamily="18" charset="0"/>
+                <a:cs typeface="Times New Roman" panose="02020603050405020304" pitchFamily="18" charset="0"/>
+              </a:rPr>
               <a:t>Trello</a:t>
             </a:r>
-            <a:endParaRPr lang="en-US" dirty="0" smtClean="0"/>
+            <a:endParaRPr lang="en-US" sz="2000" dirty="0" smtClean="0">
+              <a:latin typeface="Times New Roman" panose="02020603050405020304" pitchFamily="18" charset="0"/>
+              <a:cs typeface="Times New Roman" panose="02020603050405020304" pitchFamily="18" charset="0"/>
+            </a:endParaRPr>
           </a:p>
           <a:p>
             <a:pPr marL="285750" indent="-285750">
@@ -7340,10 +7364,16 @@
               <a:buChar char="§"/>
             </a:pPr>
             <a:r>
-              <a:rPr lang="en-US" dirty="0" err="1" smtClean="0"/>
+              <a:rPr lang="en-US" sz="2000" dirty="0" err="1" smtClean="0">
+                <a:latin typeface="Times New Roman" panose="02020603050405020304" pitchFamily="18" charset="0"/>
+                <a:cs typeface="Times New Roman" panose="02020603050405020304" pitchFamily="18" charset="0"/>
+              </a:rPr>
               <a:t>GitHub</a:t>
             </a:r>
-            <a:endParaRPr lang="en-US" dirty="0" smtClean="0"/>
+            <a:endParaRPr lang="en-US" sz="2000" dirty="0" smtClean="0">
+              <a:latin typeface="Times New Roman" panose="02020603050405020304" pitchFamily="18" charset="0"/>
+              <a:cs typeface="Times New Roman" panose="02020603050405020304" pitchFamily="18" charset="0"/>
+            </a:endParaRPr>
           </a:p>
           <a:p>
             <a:pPr marL="285750" indent="-285750">
@@ -7351,12 +7381,18 @@
               <a:buChar char="§"/>
             </a:pPr>
             <a:r>
-              <a:rPr lang="en-US" smtClean="0"/>
+              <a:rPr lang="en-US" sz="2000" smtClean="0">
+                <a:latin typeface="Times New Roman" panose="02020603050405020304" pitchFamily="18" charset="0"/>
+                <a:cs typeface="Times New Roman" panose="02020603050405020304" pitchFamily="18" charset="0"/>
+              </a:rPr>
               <a:t>Facebook</a:t>
             </a:r>
           </a:p>
           <a:p>
-            <a:endParaRPr lang="en-US" dirty="0" smtClean="0"/>
+            <a:endParaRPr lang="en-US" sz="2000" dirty="0" smtClean="0">
+              <a:latin typeface="Times New Roman" panose="02020603050405020304" pitchFamily="18" charset="0"/>
+              <a:cs typeface="Times New Roman" panose="02020603050405020304" pitchFamily="18" charset="0"/>
+            </a:endParaRPr>
           </a:p>
           <a:p>
             <a:pPr marL="285750" indent="-285750">
@@ -7364,51 +7400,87 @@
               <a:buChar char="Ø"/>
             </a:pPr>
             <a:r>
-              <a:rPr lang="en-US" dirty="0" err="1" smtClean="0"/>
+              <a:rPr lang="en-US" sz="2000" dirty="0" err="1" smtClean="0">
+                <a:latin typeface="Times New Roman" panose="02020603050405020304" pitchFamily="18" charset="0"/>
+                <a:cs typeface="Times New Roman" panose="02020603050405020304" pitchFamily="18" charset="0"/>
+              </a:rPr>
               <a:t>Công</a:t>
             </a:r>
             <a:r>
-              <a:rPr lang="en-US" dirty="0" smtClean="0"/>
-              <a:t> </a:t>
-            </a:r>
-            <a:r>
-              <a:rPr lang="en-US" dirty="0" err="1" smtClean="0"/>
+              <a:rPr lang="en-US" sz="2000" dirty="0" smtClean="0">
+                <a:latin typeface="Times New Roman" panose="02020603050405020304" pitchFamily="18" charset="0"/>
+                <a:cs typeface="Times New Roman" panose="02020603050405020304" pitchFamily="18" charset="0"/>
+              </a:rPr>
+              <a:t> </a:t>
+            </a:r>
+            <a:r>
+              <a:rPr lang="en-US" sz="2000" dirty="0" err="1" smtClean="0">
+                <a:latin typeface="Times New Roman" panose="02020603050405020304" pitchFamily="18" charset="0"/>
+                <a:cs typeface="Times New Roman" panose="02020603050405020304" pitchFamily="18" charset="0"/>
+              </a:rPr>
               <a:t>Nghệ</a:t>
             </a:r>
             <a:r>
-              <a:rPr lang="en-US" dirty="0" smtClean="0"/>
-              <a:t> </a:t>
-            </a:r>
-            <a:r>
-              <a:rPr lang="en-US" dirty="0" err="1" smtClean="0"/>
+              <a:rPr lang="en-US" sz="2000" dirty="0" smtClean="0">
+                <a:latin typeface="Times New Roman" panose="02020603050405020304" pitchFamily="18" charset="0"/>
+                <a:cs typeface="Times New Roman" panose="02020603050405020304" pitchFamily="18" charset="0"/>
+              </a:rPr>
+              <a:t> </a:t>
+            </a:r>
+            <a:r>
+              <a:rPr lang="en-US" sz="2000" dirty="0" err="1" smtClean="0">
+                <a:latin typeface="Times New Roman" panose="02020603050405020304" pitchFamily="18" charset="0"/>
+                <a:cs typeface="Times New Roman" panose="02020603050405020304" pitchFamily="18" charset="0"/>
+              </a:rPr>
               <a:t>Lưu</a:t>
             </a:r>
             <a:r>
-              <a:rPr lang="en-US" dirty="0" smtClean="0"/>
-              <a:t> </a:t>
-            </a:r>
-            <a:r>
-              <a:rPr lang="en-US" dirty="0" err="1" smtClean="0"/>
+              <a:rPr lang="en-US" sz="2000" dirty="0" smtClean="0">
+                <a:latin typeface="Times New Roman" panose="02020603050405020304" pitchFamily="18" charset="0"/>
+                <a:cs typeface="Times New Roman" panose="02020603050405020304" pitchFamily="18" charset="0"/>
+              </a:rPr>
+              <a:t> </a:t>
+            </a:r>
+            <a:r>
+              <a:rPr lang="en-US" sz="2000" dirty="0" err="1" smtClean="0">
+                <a:latin typeface="Times New Roman" panose="02020603050405020304" pitchFamily="18" charset="0"/>
+                <a:cs typeface="Times New Roman" panose="02020603050405020304" pitchFamily="18" charset="0"/>
+              </a:rPr>
               <a:t>Trữ</a:t>
             </a:r>
             <a:r>
-              <a:rPr lang="en-US" dirty="0" smtClean="0"/>
-              <a:t> </a:t>
-            </a:r>
-            <a:r>
-              <a:rPr lang="en-US" dirty="0" err="1" smtClean="0"/>
+              <a:rPr lang="en-US" sz="2000" dirty="0" smtClean="0">
+                <a:latin typeface="Times New Roman" panose="02020603050405020304" pitchFamily="18" charset="0"/>
+                <a:cs typeface="Times New Roman" panose="02020603050405020304" pitchFamily="18" charset="0"/>
+              </a:rPr>
+              <a:t> </a:t>
+            </a:r>
+            <a:r>
+              <a:rPr lang="en-US" sz="2000" dirty="0" err="1" smtClean="0">
+                <a:latin typeface="Times New Roman" panose="02020603050405020304" pitchFamily="18" charset="0"/>
+                <a:cs typeface="Times New Roman" panose="02020603050405020304" pitchFamily="18" charset="0"/>
+              </a:rPr>
               <a:t>Dữ</a:t>
             </a:r>
             <a:r>
-              <a:rPr lang="en-US" dirty="0" smtClean="0"/>
-              <a:t> </a:t>
-            </a:r>
-            <a:r>
-              <a:rPr lang="en-US" dirty="0" err="1" smtClean="0"/>
+              <a:rPr lang="en-US" sz="2000" dirty="0" smtClean="0">
+                <a:latin typeface="Times New Roman" panose="02020603050405020304" pitchFamily="18" charset="0"/>
+                <a:cs typeface="Times New Roman" panose="02020603050405020304" pitchFamily="18" charset="0"/>
+              </a:rPr>
+              <a:t> </a:t>
+            </a:r>
+            <a:r>
+              <a:rPr lang="en-US" sz="2000" dirty="0" err="1" smtClean="0">
+                <a:latin typeface="Times New Roman" panose="02020603050405020304" pitchFamily="18" charset="0"/>
+                <a:cs typeface="Times New Roman" panose="02020603050405020304" pitchFamily="18" charset="0"/>
+              </a:rPr>
               <a:t>Liệu</a:t>
             </a:r>
             <a:r>
-              <a:rPr lang="en-US" dirty="0" smtClean="0"/>
+              <a:rPr lang="en-US" sz="2000" dirty="0" smtClean="0">
+                <a:latin typeface="Times New Roman" panose="02020603050405020304" pitchFamily="18" charset="0"/>
+                <a:cs typeface="Times New Roman" panose="02020603050405020304" pitchFamily="18" charset="0"/>
+              </a:rPr>
               <a:t>:</a:t>
             </a:r>
           </a:p>
@@ -7650,7 +7722,7 @@
           <a:lstStyle/>
           <a:p>
             <a:r>
-              <a:rPr lang="en-US" sz="2800" dirty="0" err="1" smtClean="0">
+              <a:rPr lang="en-US" sz="2800" err="1" smtClean="0">
                 <a:solidFill>
                   <a:srgbClr val="FF0000"/>
                 </a:solidFill>
@@ -7660,7 +7732,7 @@
               <a:t>Chức</a:t>
             </a:r>
             <a:r>
-              <a:rPr lang="en-US" sz="2800" dirty="0" smtClean="0">
+              <a:rPr lang="en-US" sz="2800" smtClean="0">
                 <a:solidFill>
                   <a:srgbClr val="FF0000"/>
                 </a:solidFill>
@@ -7670,24 +7742,14 @@
               <a:t> </a:t>
             </a:r>
             <a:r>
-              <a:rPr lang="en-US" sz="2800" dirty="0" err="1" smtClean="0">
+              <a:rPr lang="en-US" sz="2800" smtClean="0">
                 <a:solidFill>
                   <a:srgbClr val="FF0000"/>
                 </a:solidFill>
                 <a:latin typeface="Times New Roman" panose="02020603050405020304" pitchFamily="18" charset="0"/>
                 <a:cs typeface="Times New Roman" panose="02020603050405020304" pitchFamily="18" charset="0"/>
               </a:rPr>
-              <a:t>năng</a:t>
-            </a:r>
-            <a:r>
-              <a:rPr lang="en-US" sz="2800" dirty="0" smtClean="0">
-                <a:solidFill>
-                  <a:srgbClr val="FF0000"/>
-                </a:solidFill>
-                <a:latin typeface="Times New Roman" panose="02020603050405020304" pitchFamily="18" charset="0"/>
-                <a:cs typeface="Times New Roman" panose="02020603050405020304" pitchFamily="18" charset="0"/>
-              </a:rPr>
-              <a:t> Login</a:t>
+              <a:t>năng Đăng Nhập</a:t>
             </a:r>
             <a:endParaRPr lang="en-US" sz="2800" dirty="0">
               <a:solidFill>
@@ -7949,7 +8011,7 @@
       </p:grpSpPr>
       <p:pic>
         <p:nvPicPr>
-          <p:cNvPr id="4" name="Picture 3"/>
+          <p:cNvPr id="5" name="Picture 4"/>
           <p:cNvPicPr>
             <a:picLocks noChangeAspect="1"/>
           </p:cNvPicPr>
@@ -7957,30 +8019,6 @@
         </p:nvPicPr>
         <p:blipFill>
           <a:blip r:embed="rId2"/>
-          <a:stretch>
-            <a:fillRect/>
-          </a:stretch>
-        </p:blipFill>
-        <p:spPr>
-          <a:xfrm>
-            <a:off x="8719458" y="1"/>
-            <a:ext cx="3472542" cy="6858000"/>
-          </a:xfrm>
-          <a:prstGeom prst="rect">
-            <a:avLst/>
-          </a:prstGeom>
-        </p:spPr>
-      </p:pic>
-      <p:pic>
-        <p:nvPicPr>
-          <p:cNvPr id="5" name="Picture 4"/>
-          <p:cNvPicPr>
-            <a:picLocks noChangeAspect="1"/>
-          </p:cNvPicPr>
-          <p:nvPr/>
-        </p:nvPicPr>
-        <p:blipFill>
-          <a:blip r:embed="rId3"/>
           <a:stretch>
             <a:fillRect/>
           </a:stretch>
@@ -8146,7 +8184,7 @@
           <p:nvPr/>
         </p:nvPicPr>
         <p:blipFill>
-          <a:blip r:embed="rId4"/>
+          <a:blip r:embed="rId3"/>
           <a:stretch>
             <a:fillRect/>
           </a:stretch>
@@ -8155,6 +8193,36 @@
           <a:xfrm>
             <a:off x="88445" y="703489"/>
             <a:ext cx="7639050" cy="2583997"/>
+          </a:xfrm>
+          <a:prstGeom prst="rect">
+            <a:avLst/>
+          </a:prstGeom>
+        </p:spPr>
+      </p:pic>
+      <p:pic>
+        <p:nvPicPr>
+          <p:cNvPr id="2" name="Picture 1"/>
+          <p:cNvPicPr>
+            <a:picLocks noChangeAspect="1"/>
+          </p:cNvPicPr>
+          <p:nvPr/>
+        </p:nvPicPr>
+        <p:blipFill>
+          <a:blip r:embed="rId4">
+            <a:extLst>
+              <a:ext uri="{28A0092B-C50C-407E-A947-70E740481C1C}">
+                <a14:useLocalDpi xmlns:a14="http://schemas.microsoft.com/office/drawing/2010/main" val="0"/>
+              </a:ext>
+            </a:extLst>
+          </a:blip>
+          <a:stretch>
+            <a:fillRect/>
+          </a:stretch>
+        </p:blipFill>
+        <p:spPr>
+          <a:xfrm>
+            <a:off x="8234802" y="703489"/>
+            <a:ext cx="3957198" cy="6154511"/>
           </a:xfrm>
           <a:prstGeom prst="rect">
             <a:avLst/>
@@ -8877,6 +8945,1033 @@
           <a:chExt cx="0" cy="0"/>
         </a:xfrm>
       </p:grpSpPr>
+      <p:sp>
+        <p:nvSpPr>
+          <p:cNvPr id="4" name="TextBox 3"/>
+          <p:cNvSpPr txBox="1"/>
+          <p:nvPr/>
+        </p:nvSpPr>
+        <p:spPr>
+          <a:xfrm>
+            <a:off x="88444" y="0"/>
+            <a:ext cx="5158469" cy="523220"/>
+          </a:xfrm>
+          <a:prstGeom prst="rect">
+            <a:avLst/>
+          </a:prstGeom>
+          <a:noFill/>
+        </p:spPr>
+        <p:txBody>
+          <a:bodyPr wrap="square" rtlCol="0">
+            <a:spAutoFit/>
+          </a:bodyPr>
+          <a:lstStyle/>
+          <a:p>
+            <a:r>
+              <a:rPr lang="en-US" sz="2800" err="1" smtClean="0">
+                <a:solidFill>
+                  <a:srgbClr val="FF0000"/>
+                </a:solidFill>
+                <a:latin typeface="Times New Roman" panose="02020603050405020304" pitchFamily="18" charset="0"/>
+                <a:cs typeface="Times New Roman" panose="02020603050405020304" pitchFamily="18" charset="0"/>
+              </a:rPr>
+              <a:t>Chức</a:t>
+            </a:r>
+            <a:r>
+              <a:rPr lang="en-US" sz="2800" smtClean="0">
+                <a:solidFill>
+                  <a:srgbClr val="FF0000"/>
+                </a:solidFill>
+                <a:latin typeface="Times New Roman" panose="02020603050405020304" pitchFamily="18" charset="0"/>
+                <a:cs typeface="Times New Roman" panose="02020603050405020304" pitchFamily="18" charset="0"/>
+              </a:rPr>
+              <a:t> </a:t>
+            </a:r>
+            <a:r>
+              <a:rPr lang="en-US" sz="2800" smtClean="0">
+                <a:solidFill>
+                  <a:srgbClr val="FF0000"/>
+                </a:solidFill>
+                <a:latin typeface="Times New Roman" panose="02020603050405020304" pitchFamily="18" charset="0"/>
+                <a:cs typeface="Times New Roman" panose="02020603050405020304" pitchFamily="18" charset="0"/>
+              </a:rPr>
+              <a:t>năng</a:t>
+            </a:r>
+            <a:r>
+              <a:rPr lang="en-US" sz="2800">
+                <a:solidFill>
+                  <a:srgbClr val="FF0000"/>
+                </a:solidFill>
+                <a:latin typeface="Times New Roman" panose="02020603050405020304" pitchFamily="18" charset="0"/>
+                <a:cs typeface="Times New Roman" panose="02020603050405020304" pitchFamily="18" charset="0"/>
+              </a:rPr>
+              <a:t> </a:t>
+            </a:r>
+            <a:r>
+              <a:rPr lang="en-US" sz="2800" smtClean="0">
+                <a:solidFill>
+                  <a:srgbClr val="FF0000"/>
+                </a:solidFill>
+                <a:latin typeface="Times New Roman" panose="02020603050405020304" pitchFamily="18" charset="0"/>
+                <a:cs typeface="Times New Roman" panose="02020603050405020304" pitchFamily="18" charset="0"/>
+              </a:rPr>
+              <a:t>Thêm sản phẩm</a:t>
+            </a:r>
+            <a:endParaRPr lang="en-US" sz="2800" dirty="0">
+              <a:solidFill>
+                <a:srgbClr val="FF0000"/>
+              </a:solidFill>
+              <a:latin typeface="Times New Roman" panose="02020603050405020304" pitchFamily="18" charset="0"/>
+              <a:cs typeface="Times New Roman" panose="02020603050405020304" pitchFamily="18" charset="0"/>
+            </a:endParaRPr>
+          </a:p>
+        </p:txBody>
+      </p:sp>
+      <p:pic>
+        <p:nvPicPr>
+          <p:cNvPr id="7" name="Picture 6"/>
+          <p:cNvPicPr>
+            <a:picLocks noChangeAspect="1"/>
+          </p:cNvPicPr>
+          <p:nvPr/>
+        </p:nvPicPr>
+        <p:blipFill>
+          <a:blip r:embed="rId2">
+            <a:extLst>
+              <a:ext uri="{28A0092B-C50C-407E-A947-70E740481C1C}">
+                <a14:useLocalDpi xmlns:a14="http://schemas.microsoft.com/office/drawing/2010/main" val="0"/>
+              </a:ext>
+            </a:extLst>
+          </a:blip>
+          <a:stretch>
+            <a:fillRect/>
+          </a:stretch>
+        </p:blipFill>
+        <p:spPr>
+          <a:xfrm>
+            <a:off x="8168772" y="0"/>
+            <a:ext cx="4023228" cy="6857070"/>
+          </a:xfrm>
+          <a:prstGeom prst="rect">
+            <a:avLst/>
+          </a:prstGeom>
+        </p:spPr>
+      </p:pic>
+      <p:pic>
+        <p:nvPicPr>
+          <p:cNvPr id="10" name="Picture 9"/>
+          <p:cNvPicPr>
+            <a:picLocks noChangeAspect="1"/>
+          </p:cNvPicPr>
+          <p:nvPr/>
+        </p:nvPicPr>
+        <p:blipFill>
+          <a:blip r:embed="rId3">
+            <a:extLst>
+              <a:ext uri="{28A0092B-C50C-407E-A947-70E740481C1C}">
+                <a14:useLocalDpi xmlns:a14="http://schemas.microsoft.com/office/drawing/2010/main" val="0"/>
+              </a:ext>
+            </a:extLst>
+          </a:blip>
+          <a:stretch>
+            <a:fillRect/>
+          </a:stretch>
+        </p:blipFill>
+        <p:spPr>
+          <a:xfrm>
+            <a:off x="0" y="1449652"/>
+            <a:ext cx="8143702" cy="4530043"/>
+          </a:xfrm>
+          <a:prstGeom prst="rect">
+            <a:avLst/>
+          </a:prstGeom>
+        </p:spPr>
+      </p:pic>
+    </p:spTree>
+    <p:extLst>
+      <p:ext uri="{BB962C8B-B14F-4D97-AF65-F5344CB8AC3E}">
+        <p14:creationId xmlns:p14="http://schemas.microsoft.com/office/powerpoint/2010/main" val="4220434784"/>
+      </p:ext>
+    </p:extLst>
+  </p:cSld>
+  <p:clrMapOvr>
+    <a:masterClrMapping/>
+  </p:clrMapOvr>
+</p:sld>
+</file>
+
+<file path=ppt/slides/slide19.xml><?xml version="1.0" encoding="utf-8"?>
+<p:sld xmlns:a="http://schemas.openxmlformats.org/drawingml/2006/main" xmlns:r="http://schemas.openxmlformats.org/officeDocument/2006/relationships" xmlns:p="http://schemas.openxmlformats.org/presentationml/2006/main">
+  <p:cSld>
+    <p:spTree>
+      <p:nvGrpSpPr>
+        <p:cNvPr id="1" name=""/>
+        <p:cNvGrpSpPr/>
+        <p:nvPr/>
+      </p:nvGrpSpPr>
+      <p:grpSpPr>
+        <a:xfrm>
+          <a:off x="0" y="0"/>
+          <a:ext cx="0" cy="0"/>
+          <a:chOff x="0" y="0"/>
+          <a:chExt cx="0" cy="0"/>
+        </a:xfrm>
+      </p:grpSpPr>
+      <p:sp>
+        <p:nvSpPr>
+          <p:cNvPr id="4" name="TextBox 3"/>
+          <p:cNvSpPr txBox="1"/>
+          <p:nvPr/>
+        </p:nvSpPr>
+        <p:spPr>
+          <a:xfrm>
+            <a:off x="88444" y="0"/>
+            <a:ext cx="5158469" cy="523220"/>
+          </a:xfrm>
+          <a:prstGeom prst="rect">
+            <a:avLst/>
+          </a:prstGeom>
+          <a:noFill/>
+        </p:spPr>
+        <p:txBody>
+          <a:bodyPr wrap="square" rtlCol="0">
+            <a:spAutoFit/>
+          </a:bodyPr>
+          <a:lstStyle/>
+          <a:p>
+            <a:r>
+              <a:rPr lang="en-US" sz="2800" err="1" smtClean="0">
+                <a:solidFill>
+                  <a:srgbClr val="FF0000"/>
+                </a:solidFill>
+                <a:latin typeface="Times New Roman" panose="02020603050405020304" pitchFamily="18" charset="0"/>
+                <a:cs typeface="Times New Roman" panose="02020603050405020304" pitchFamily="18" charset="0"/>
+              </a:rPr>
+              <a:t>Chức</a:t>
+            </a:r>
+            <a:r>
+              <a:rPr lang="en-US" sz="2800" smtClean="0">
+                <a:solidFill>
+                  <a:srgbClr val="FF0000"/>
+                </a:solidFill>
+                <a:latin typeface="Times New Roman" panose="02020603050405020304" pitchFamily="18" charset="0"/>
+                <a:cs typeface="Times New Roman" panose="02020603050405020304" pitchFamily="18" charset="0"/>
+              </a:rPr>
+              <a:t> </a:t>
+            </a:r>
+            <a:r>
+              <a:rPr lang="en-US" sz="2800" smtClean="0">
+                <a:solidFill>
+                  <a:srgbClr val="FF0000"/>
+                </a:solidFill>
+                <a:latin typeface="Times New Roman" panose="02020603050405020304" pitchFamily="18" charset="0"/>
+                <a:cs typeface="Times New Roman" panose="02020603050405020304" pitchFamily="18" charset="0"/>
+              </a:rPr>
+              <a:t>năng</a:t>
+            </a:r>
+            <a:r>
+              <a:rPr lang="en-US" sz="2800">
+                <a:solidFill>
+                  <a:srgbClr val="FF0000"/>
+                </a:solidFill>
+                <a:latin typeface="Times New Roman" panose="02020603050405020304" pitchFamily="18" charset="0"/>
+                <a:cs typeface="Times New Roman" panose="02020603050405020304" pitchFamily="18" charset="0"/>
+              </a:rPr>
+              <a:t> </a:t>
+            </a:r>
+            <a:r>
+              <a:rPr lang="en-US" sz="2800" smtClean="0">
+                <a:solidFill>
+                  <a:srgbClr val="FF0000"/>
+                </a:solidFill>
+                <a:latin typeface="Times New Roman" panose="02020603050405020304" pitchFamily="18" charset="0"/>
+                <a:cs typeface="Times New Roman" panose="02020603050405020304" pitchFamily="18" charset="0"/>
+              </a:rPr>
+              <a:t>Sửa sản phẩm</a:t>
+            </a:r>
+            <a:endParaRPr lang="en-US" sz="2800" dirty="0">
+              <a:solidFill>
+                <a:srgbClr val="FF0000"/>
+              </a:solidFill>
+              <a:latin typeface="Times New Roman" panose="02020603050405020304" pitchFamily="18" charset="0"/>
+              <a:cs typeface="Times New Roman" panose="02020603050405020304" pitchFamily="18" charset="0"/>
+            </a:endParaRPr>
+          </a:p>
+        </p:txBody>
+      </p:sp>
+      <p:pic>
+        <p:nvPicPr>
+          <p:cNvPr id="7" name="Picture 6"/>
+          <p:cNvPicPr>
+            <a:picLocks noChangeAspect="1"/>
+          </p:cNvPicPr>
+          <p:nvPr/>
+        </p:nvPicPr>
+        <p:blipFill>
+          <a:blip r:embed="rId2">
+            <a:extLst>
+              <a:ext uri="{28A0092B-C50C-407E-A947-70E740481C1C}">
+                <a14:useLocalDpi xmlns:a14="http://schemas.microsoft.com/office/drawing/2010/main" val="0"/>
+              </a:ext>
+            </a:extLst>
+          </a:blip>
+          <a:stretch>
+            <a:fillRect/>
+          </a:stretch>
+        </p:blipFill>
+        <p:spPr>
+          <a:xfrm>
+            <a:off x="8182869" y="0"/>
+            <a:ext cx="4009132" cy="6858000"/>
+          </a:xfrm>
+          <a:prstGeom prst="rect">
+            <a:avLst/>
+          </a:prstGeom>
+        </p:spPr>
+      </p:pic>
+      <p:pic>
+        <p:nvPicPr>
+          <p:cNvPr id="8" name="Picture 7"/>
+          <p:cNvPicPr>
+            <a:picLocks noChangeAspect="1"/>
+          </p:cNvPicPr>
+          <p:nvPr/>
+        </p:nvPicPr>
+        <p:blipFill>
+          <a:blip r:embed="rId3">
+            <a:extLst>
+              <a:ext uri="{28A0092B-C50C-407E-A947-70E740481C1C}">
+                <a14:useLocalDpi xmlns:a14="http://schemas.microsoft.com/office/drawing/2010/main" val="0"/>
+              </a:ext>
+            </a:extLst>
+          </a:blip>
+          <a:stretch>
+            <a:fillRect/>
+          </a:stretch>
+        </p:blipFill>
+        <p:spPr>
+          <a:xfrm>
+            <a:off x="0" y="523220"/>
+            <a:ext cx="7628021" cy="4113988"/>
+          </a:xfrm>
+          <a:prstGeom prst="rect">
+            <a:avLst/>
+          </a:prstGeom>
+        </p:spPr>
+      </p:pic>
+      <p:pic>
+        <p:nvPicPr>
+          <p:cNvPr id="9" name="Picture 8"/>
+          <p:cNvPicPr>
+            <a:picLocks noChangeAspect="1"/>
+          </p:cNvPicPr>
+          <p:nvPr/>
+        </p:nvPicPr>
+        <p:blipFill>
+          <a:blip r:embed="rId4">
+            <a:extLst>
+              <a:ext uri="{28A0092B-C50C-407E-A947-70E740481C1C}">
+                <a14:useLocalDpi xmlns:a14="http://schemas.microsoft.com/office/drawing/2010/main" val="0"/>
+              </a:ext>
+            </a:extLst>
+          </a:blip>
+          <a:stretch>
+            <a:fillRect/>
+          </a:stretch>
+        </p:blipFill>
+        <p:spPr>
+          <a:xfrm>
+            <a:off x="0" y="4637209"/>
+            <a:ext cx="7628021" cy="2190774"/>
+          </a:xfrm>
+          <a:prstGeom prst="rect">
+            <a:avLst/>
+          </a:prstGeom>
+        </p:spPr>
+      </p:pic>
+    </p:spTree>
+    <p:extLst>
+      <p:ext uri="{BB962C8B-B14F-4D97-AF65-F5344CB8AC3E}">
+        <p14:creationId xmlns:p14="http://schemas.microsoft.com/office/powerpoint/2010/main" val="774451527"/>
+      </p:ext>
+    </p:extLst>
+  </p:cSld>
+  <p:clrMapOvr>
+    <a:masterClrMapping/>
+  </p:clrMapOvr>
+</p:sld>
+</file>
+
+<file path=ppt/slides/slide2.xml><?xml version="1.0" encoding="utf-8"?>
+<p:sld xmlns:a="http://schemas.openxmlformats.org/drawingml/2006/main" xmlns:r="http://schemas.openxmlformats.org/officeDocument/2006/relationships" xmlns:p="http://schemas.openxmlformats.org/presentationml/2006/main">
+  <p:cSld>
+    <p:spTree>
+      <p:nvGrpSpPr>
+        <p:cNvPr id="1" name=""/>
+        <p:cNvGrpSpPr/>
+        <p:nvPr/>
+      </p:nvGrpSpPr>
+      <p:grpSpPr>
+        <a:xfrm>
+          <a:off x="0" y="0"/>
+          <a:ext cx="0" cy="0"/>
+          <a:chOff x="0" y="0"/>
+          <a:chExt cx="0" cy="0"/>
+        </a:xfrm>
+      </p:grpSpPr>
+      <p:sp>
+        <p:nvSpPr>
+          <p:cNvPr id="4" name="TextBox 3"/>
+          <p:cNvSpPr txBox="1"/>
+          <p:nvPr/>
+        </p:nvSpPr>
+        <p:spPr>
+          <a:xfrm>
+            <a:off x="544286" y="664028"/>
+            <a:ext cx="8338457" cy="3539430"/>
+          </a:xfrm>
+          <a:prstGeom prst="rect">
+            <a:avLst/>
+          </a:prstGeom>
+          <a:noFill/>
+        </p:spPr>
+        <p:txBody>
+          <a:bodyPr wrap="square" rtlCol="0">
+            <a:spAutoFit/>
+          </a:bodyPr>
+          <a:lstStyle/>
+          <a:p>
+            <a:r>
+              <a:rPr lang="en-US" sz="2800" dirty="0" err="1" smtClean="0">
+                <a:latin typeface="Times New Roman" panose="02020603050405020304" pitchFamily="18" charset="0"/>
+                <a:cs typeface="Times New Roman" panose="02020603050405020304" pitchFamily="18" charset="0"/>
+              </a:rPr>
+              <a:t>Mục</a:t>
+            </a:r>
+            <a:r>
+              <a:rPr lang="en-US" sz="2800" dirty="0" smtClean="0">
+                <a:latin typeface="Times New Roman" panose="02020603050405020304" pitchFamily="18" charset="0"/>
+                <a:cs typeface="Times New Roman" panose="02020603050405020304" pitchFamily="18" charset="0"/>
+              </a:rPr>
+              <a:t> </a:t>
+            </a:r>
+            <a:r>
+              <a:rPr lang="en-US" sz="2800" dirty="0" err="1" smtClean="0">
+                <a:latin typeface="Times New Roman" panose="02020603050405020304" pitchFamily="18" charset="0"/>
+                <a:cs typeface="Times New Roman" panose="02020603050405020304" pitchFamily="18" charset="0"/>
+              </a:rPr>
+              <a:t>Lục</a:t>
+            </a:r>
+            <a:endParaRPr lang="en-US" sz="2800" dirty="0" smtClean="0">
+              <a:latin typeface="Times New Roman" panose="02020603050405020304" pitchFamily="18" charset="0"/>
+              <a:cs typeface="Times New Roman" panose="02020603050405020304" pitchFamily="18" charset="0"/>
+            </a:endParaRPr>
+          </a:p>
+          <a:p>
+            <a:pPr marL="342900" indent="-342900">
+              <a:buAutoNum type="arabicPeriod"/>
+            </a:pPr>
+            <a:r>
+              <a:rPr lang="en-US" sz="2800" dirty="0" err="1" smtClean="0">
+                <a:latin typeface="Times New Roman" panose="02020603050405020304" pitchFamily="18" charset="0"/>
+                <a:cs typeface="Times New Roman" panose="02020603050405020304" pitchFamily="18" charset="0"/>
+              </a:rPr>
+              <a:t>Giới</a:t>
+            </a:r>
+            <a:r>
+              <a:rPr lang="en-US" sz="2800" dirty="0" smtClean="0">
+                <a:latin typeface="Times New Roman" panose="02020603050405020304" pitchFamily="18" charset="0"/>
+                <a:cs typeface="Times New Roman" panose="02020603050405020304" pitchFamily="18" charset="0"/>
+              </a:rPr>
+              <a:t> </a:t>
+            </a:r>
+            <a:r>
+              <a:rPr lang="en-US" sz="2800" dirty="0" err="1" smtClean="0">
+                <a:latin typeface="Times New Roman" panose="02020603050405020304" pitchFamily="18" charset="0"/>
+                <a:cs typeface="Times New Roman" panose="02020603050405020304" pitchFamily="18" charset="0"/>
+              </a:rPr>
+              <a:t>Thiệu</a:t>
+            </a:r>
+            <a:r>
+              <a:rPr lang="en-US" sz="2800" dirty="0" smtClean="0">
+                <a:latin typeface="Times New Roman" panose="02020603050405020304" pitchFamily="18" charset="0"/>
+                <a:cs typeface="Times New Roman" panose="02020603050405020304" pitchFamily="18" charset="0"/>
+              </a:rPr>
+              <a:t> </a:t>
+            </a:r>
+            <a:r>
+              <a:rPr lang="en-US" sz="2800" dirty="0" err="1" smtClean="0">
+                <a:latin typeface="Times New Roman" panose="02020603050405020304" pitchFamily="18" charset="0"/>
+                <a:cs typeface="Times New Roman" panose="02020603050405020304" pitchFamily="18" charset="0"/>
+              </a:rPr>
+              <a:t>Đồ</a:t>
+            </a:r>
+            <a:r>
+              <a:rPr lang="en-US" sz="2800" dirty="0" smtClean="0">
+                <a:latin typeface="Times New Roman" panose="02020603050405020304" pitchFamily="18" charset="0"/>
+                <a:cs typeface="Times New Roman" panose="02020603050405020304" pitchFamily="18" charset="0"/>
+              </a:rPr>
+              <a:t> </a:t>
+            </a:r>
+            <a:r>
+              <a:rPr lang="en-US" sz="2800" dirty="0" err="1" smtClean="0">
+                <a:latin typeface="Times New Roman" panose="02020603050405020304" pitchFamily="18" charset="0"/>
+                <a:cs typeface="Times New Roman" panose="02020603050405020304" pitchFamily="18" charset="0"/>
+              </a:rPr>
+              <a:t>Án</a:t>
+            </a:r>
+            <a:endParaRPr lang="en-US" sz="2800" dirty="0" smtClean="0">
+              <a:latin typeface="Times New Roman" panose="02020603050405020304" pitchFamily="18" charset="0"/>
+              <a:cs typeface="Times New Roman" panose="02020603050405020304" pitchFamily="18" charset="0"/>
+            </a:endParaRPr>
+          </a:p>
+          <a:p>
+            <a:pPr marL="342900" indent="-342900">
+              <a:buAutoNum type="arabicPeriod"/>
+            </a:pPr>
+            <a:r>
+              <a:rPr lang="en-US" sz="2800" dirty="0" err="1" smtClean="0">
+                <a:latin typeface="Times New Roman" panose="02020603050405020304" pitchFamily="18" charset="0"/>
+                <a:cs typeface="Times New Roman" panose="02020603050405020304" pitchFamily="18" charset="0"/>
+              </a:rPr>
+              <a:t>Phân</a:t>
+            </a:r>
+            <a:r>
+              <a:rPr lang="en-US" sz="2800" dirty="0" smtClean="0">
+                <a:latin typeface="Times New Roman" panose="02020603050405020304" pitchFamily="18" charset="0"/>
+                <a:cs typeface="Times New Roman" panose="02020603050405020304" pitchFamily="18" charset="0"/>
+              </a:rPr>
+              <a:t> </a:t>
+            </a:r>
+            <a:r>
+              <a:rPr lang="en-US" sz="2800" dirty="0" err="1" smtClean="0">
+                <a:latin typeface="Times New Roman" panose="02020603050405020304" pitchFamily="18" charset="0"/>
+                <a:cs typeface="Times New Roman" panose="02020603050405020304" pitchFamily="18" charset="0"/>
+              </a:rPr>
+              <a:t>Tích</a:t>
+            </a:r>
+            <a:r>
+              <a:rPr lang="en-US" sz="2800" dirty="0" smtClean="0">
+                <a:latin typeface="Times New Roman" panose="02020603050405020304" pitchFamily="18" charset="0"/>
+                <a:cs typeface="Times New Roman" panose="02020603050405020304" pitchFamily="18" charset="0"/>
+              </a:rPr>
+              <a:t> </a:t>
+            </a:r>
+            <a:r>
+              <a:rPr lang="en-US" sz="2800" dirty="0" err="1" smtClean="0">
+                <a:latin typeface="Times New Roman" panose="02020603050405020304" pitchFamily="18" charset="0"/>
+                <a:cs typeface="Times New Roman" panose="02020603050405020304" pitchFamily="18" charset="0"/>
+              </a:rPr>
+              <a:t>Thiết</a:t>
+            </a:r>
+            <a:r>
+              <a:rPr lang="en-US" sz="2800" dirty="0" smtClean="0">
+                <a:latin typeface="Times New Roman" panose="02020603050405020304" pitchFamily="18" charset="0"/>
+                <a:cs typeface="Times New Roman" panose="02020603050405020304" pitchFamily="18" charset="0"/>
+              </a:rPr>
+              <a:t> </a:t>
+            </a:r>
+            <a:r>
+              <a:rPr lang="en-US" sz="2800" dirty="0" err="1" smtClean="0">
+                <a:latin typeface="Times New Roman" panose="02020603050405020304" pitchFamily="18" charset="0"/>
+                <a:cs typeface="Times New Roman" panose="02020603050405020304" pitchFamily="18" charset="0"/>
+              </a:rPr>
+              <a:t>Kế</a:t>
+            </a:r>
+            <a:r>
+              <a:rPr lang="en-US" sz="2800" dirty="0" smtClean="0">
+                <a:latin typeface="Times New Roman" panose="02020603050405020304" pitchFamily="18" charset="0"/>
+                <a:cs typeface="Times New Roman" panose="02020603050405020304" pitchFamily="18" charset="0"/>
+              </a:rPr>
+              <a:t> </a:t>
+            </a:r>
+            <a:r>
+              <a:rPr lang="en-US" sz="2800" dirty="0" err="1" smtClean="0">
+                <a:latin typeface="Times New Roman" panose="02020603050405020304" pitchFamily="18" charset="0"/>
+                <a:cs typeface="Times New Roman" panose="02020603050405020304" pitchFamily="18" charset="0"/>
+              </a:rPr>
+              <a:t>Cơ</a:t>
+            </a:r>
+            <a:r>
+              <a:rPr lang="en-US" sz="2800" dirty="0" smtClean="0">
+                <a:latin typeface="Times New Roman" panose="02020603050405020304" pitchFamily="18" charset="0"/>
+                <a:cs typeface="Times New Roman" panose="02020603050405020304" pitchFamily="18" charset="0"/>
+              </a:rPr>
+              <a:t> </a:t>
+            </a:r>
+            <a:r>
+              <a:rPr lang="en-US" sz="2800" dirty="0" err="1" smtClean="0">
+                <a:latin typeface="Times New Roman" panose="02020603050405020304" pitchFamily="18" charset="0"/>
+                <a:cs typeface="Times New Roman" panose="02020603050405020304" pitchFamily="18" charset="0"/>
+              </a:rPr>
+              <a:t>Sở</a:t>
+            </a:r>
+            <a:r>
+              <a:rPr lang="en-US" sz="2800" dirty="0" smtClean="0">
+                <a:latin typeface="Times New Roman" panose="02020603050405020304" pitchFamily="18" charset="0"/>
+                <a:cs typeface="Times New Roman" panose="02020603050405020304" pitchFamily="18" charset="0"/>
+              </a:rPr>
+              <a:t> </a:t>
+            </a:r>
+            <a:r>
+              <a:rPr lang="en-US" sz="2800" dirty="0" err="1" smtClean="0">
+                <a:latin typeface="Times New Roman" panose="02020603050405020304" pitchFamily="18" charset="0"/>
+                <a:cs typeface="Times New Roman" panose="02020603050405020304" pitchFamily="18" charset="0"/>
+              </a:rPr>
+              <a:t>Dữ</a:t>
+            </a:r>
+            <a:r>
+              <a:rPr lang="en-US" sz="2800" dirty="0" smtClean="0">
+                <a:latin typeface="Times New Roman" panose="02020603050405020304" pitchFamily="18" charset="0"/>
+                <a:cs typeface="Times New Roman" panose="02020603050405020304" pitchFamily="18" charset="0"/>
+              </a:rPr>
+              <a:t> </a:t>
+            </a:r>
+            <a:r>
+              <a:rPr lang="en-US" sz="2800" dirty="0" err="1" smtClean="0">
+                <a:latin typeface="Times New Roman" panose="02020603050405020304" pitchFamily="18" charset="0"/>
+                <a:cs typeface="Times New Roman" panose="02020603050405020304" pitchFamily="18" charset="0"/>
+              </a:rPr>
+              <a:t>Liệu</a:t>
+            </a:r>
+            <a:endParaRPr lang="en-US" sz="2800" dirty="0" smtClean="0">
+              <a:latin typeface="Times New Roman" panose="02020603050405020304" pitchFamily="18" charset="0"/>
+              <a:cs typeface="Times New Roman" panose="02020603050405020304" pitchFamily="18" charset="0"/>
+            </a:endParaRPr>
+          </a:p>
+          <a:p>
+            <a:pPr marL="342900" indent="-342900">
+              <a:buAutoNum type="arabicPeriod"/>
+            </a:pPr>
+            <a:r>
+              <a:rPr lang="en-US" sz="2800" dirty="0" err="1" smtClean="0">
+                <a:latin typeface="Times New Roman" panose="02020603050405020304" pitchFamily="18" charset="0"/>
+                <a:cs typeface="Times New Roman" panose="02020603050405020304" pitchFamily="18" charset="0"/>
+              </a:rPr>
+              <a:t>Hoạt</a:t>
+            </a:r>
+            <a:r>
+              <a:rPr lang="en-US" sz="2800" dirty="0" smtClean="0">
+                <a:latin typeface="Times New Roman" panose="02020603050405020304" pitchFamily="18" charset="0"/>
+                <a:cs typeface="Times New Roman" panose="02020603050405020304" pitchFamily="18" charset="0"/>
+              </a:rPr>
+              <a:t> </a:t>
+            </a:r>
+            <a:r>
+              <a:rPr lang="en-US" sz="2800" dirty="0" err="1" smtClean="0">
+                <a:latin typeface="Times New Roman" panose="02020603050405020304" pitchFamily="18" charset="0"/>
+                <a:cs typeface="Times New Roman" panose="02020603050405020304" pitchFamily="18" charset="0"/>
+              </a:rPr>
+              <a:t>Động</a:t>
+            </a:r>
+            <a:r>
+              <a:rPr lang="en-US" sz="2800" dirty="0" smtClean="0">
+                <a:latin typeface="Times New Roman" panose="02020603050405020304" pitchFamily="18" charset="0"/>
+                <a:cs typeface="Times New Roman" panose="02020603050405020304" pitchFamily="18" charset="0"/>
+              </a:rPr>
+              <a:t> (</a:t>
+            </a:r>
+            <a:r>
+              <a:rPr lang="en-US" sz="2800" dirty="0" err="1" smtClean="0">
+                <a:latin typeface="Times New Roman" panose="02020603050405020304" pitchFamily="18" charset="0"/>
+                <a:cs typeface="Times New Roman" panose="02020603050405020304" pitchFamily="18" charset="0"/>
+              </a:rPr>
+              <a:t>Acivity</a:t>
+            </a:r>
+            <a:r>
+              <a:rPr lang="en-US" sz="2800" dirty="0" smtClean="0">
+                <a:latin typeface="Times New Roman" panose="02020603050405020304" pitchFamily="18" charset="0"/>
+                <a:cs typeface="Times New Roman" panose="02020603050405020304" pitchFamily="18" charset="0"/>
+              </a:rPr>
+              <a:t>)</a:t>
+            </a:r>
+          </a:p>
+          <a:p>
+            <a:pPr marL="342900" indent="-342900">
+              <a:buAutoNum type="arabicPeriod"/>
+            </a:pPr>
+            <a:r>
+              <a:rPr lang="en-US" sz="2800" dirty="0" err="1" smtClean="0">
+                <a:latin typeface="Times New Roman" panose="02020603050405020304" pitchFamily="18" charset="0"/>
+                <a:cs typeface="Times New Roman" panose="02020603050405020304" pitchFamily="18" charset="0"/>
+              </a:rPr>
+              <a:t>Công</a:t>
+            </a:r>
+            <a:r>
+              <a:rPr lang="en-US" sz="2800" dirty="0" smtClean="0">
+                <a:latin typeface="Times New Roman" panose="02020603050405020304" pitchFamily="18" charset="0"/>
+                <a:cs typeface="Times New Roman" panose="02020603050405020304" pitchFamily="18" charset="0"/>
+              </a:rPr>
+              <a:t> </a:t>
+            </a:r>
+            <a:r>
+              <a:rPr lang="en-US" sz="2800" dirty="0" err="1" smtClean="0">
+                <a:latin typeface="Times New Roman" panose="02020603050405020304" pitchFamily="18" charset="0"/>
+                <a:cs typeface="Times New Roman" panose="02020603050405020304" pitchFamily="18" charset="0"/>
+              </a:rPr>
+              <a:t>Nghệ</a:t>
+            </a:r>
+            <a:r>
+              <a:rPr lang="en-US" sz="2800" dirty="0" smtClean="0">
+                <a:latin typeface="Times New Roman" panose="02020603050405020304" pitchFamily="18" charset="0"/>
+                <a:cs typeface="Times New Roman" panose="02020603050405020304" pitchFamily="18" charset="0"/>
+              </a:rPr>
+              <a:t> </a:t>
+            </a:r>
+            <a:r>
+              <a:rPr lang="en-US" sz="2800" dirty="0" err="1" smtClean="0">
+                <a:latin typeface="Times New Roman" panose="02020603050405020304" pitchFamily="18" charset="0"/>
+                <a:cs typeface="Times New Roman" panose="02020603050405020304" pitchFamily="18" charset="0"/>
+              </a:rPr>
+              <a:t>Sử</a:t>
+            </a:r>
+            <a:r>
+              <a:rPr lang="en-US" sz="2800" dirty="0" smtClean="0">
+                <a:latin typeface="Times New Roman" panose="02020603050405020304" pitchFamily="18" charset="0"/>
+                <a:cs typeface="Times New Roman" panose="02020603050405020304" pitchFamily="18" charset="0"/>
+              </a:rPr>
+              <a:t> </a:t>
+            </a:r>
+            <a:r>
+              <a:rPr lang="en-US" sz="2800" dirty="0" err="1" smtClean="0">
+                <a:latin typeface="Times New Roman" panose="02020603050405020304" pitchFamily="18" charset="0"/>
+                <a:cs typeface="Times New Roman" panose="02020603050405020304" pitchFamily="18" charset="0"/>
+              </a:rPr>
+              <a:t>Dụng</a:t>
+            </a:r>
+            <a:endParaRPr lang="en-US" sz="2800" dirty="0" smtClean="0">
+              <a:latin typeface="Times New Roman" panose="02020603050405020304" pitchFamily="18" charset="0"/>
+              <a:cs typeface="Times New Roman" panose="02020603050405020304" pitchFamily="18" charset="0"/>
+            </a:endParaRPr>
+          </a:p>
+          <a:p>
+            <a:pPr marL="342900" indent="-342900">
+              <a:buAutoNum type="arabicPeriod"/>
+            </a:pPr>
+            <a:r>
+              <a:rPr lang="en-US" sz="2800" dirty="0" err="1" smtClean="0">
+                <a:latin typeface="Times New Roman" panose="02020603050405020304" pitchFamily="18" charset="0"/>
+                <a:cs typeface="Times New Roman" panose="02020603050405020304" pitchFamily="18" charset="0"/>
+              </a:rPr>
+              <a:t>Triển</a:t>
+            </a:r>
+            <a:r>
+              <a:rPr lang="en-US" sz="2800" dirty="0" smtClean="0">
+                <a:latin typeface="Times New Roman" panose="02020603050405020304" pitchFamily="18" charset="0"/>
+                <a:cs typeface="Times New Roman" panose="02020603050405020304" pitchFamily="18" charset="0"/>
+              </a:rPr>
+              <a:t> </a:t>
+            </a:r>
+            <a:r>
+              <a:rPr lang="en-US" sz="2800" dirty="0" err="1" smtClean="0">
+                <a:latin typeface="Times New Roman" panose="02020603050405020304" pitchFamily="18" charset="0"/>
+                <a:cs typeface="Times New Roman" panose="02020603050405020304" pitchFamily="18" charset="0"/>
+              </a:rPr>
+              <a:t>Khai</a:t>
+            </a:r>
+            <a:r>
+              <a:rPr lang="en-US" sz="2800" dirty="0" smtClean="0">
+                <a:latin typeface="Times New Roman" panose="02020603050405020304" pitchFamily="18" charset="0"/>
+                <a:cs typeface="Times New Roman" panose="02020603050405020304" pitchFamily="18" charset="0"/>
+              </a:rPr>
+              <a:t> </a:t>
+            </a:r>
+            <a:r>
+              <a:rPr lang="en-US" sz="2800" err="1" smtClean="0">
+                <a:latin typeface="Times New Roman" panose="02020603050405020304" pitchFamily="18" charset="0"/>
+                <a:cs typeface="Times New Roman" panose="02020603050405020304" pitchFamily="18" charset="0"/>
+              </a:rPr>
+              <a:t>Ứng</a:t>
+            </a:r>
+            <a:r>
+              <a:rPr lang="en-US" sz="2800" smtClean="0">
+                <a:latin typeface="Times New Roman" panose="02020603050405020304" pitchFamily="18" charset="0"/>
+                <a:cs typeface="Times New Roman" panose="02020603050405020304" pitchFamily="18" charset="0"/>
+              </a:rPr>
+              <a:t> Dụng</a:t>
+            </a:r>
+          </a:p>
+          <a:p>
+            <a:pPr marL="342900" indent="-342900">
+              <a:buAutoNum type="arabicPeriod"/>
+            </a:pPr>
+            <a:r>
+              <a:rPr lang="en-US" sz="2800" smtClean="0">
+                <a:latin typeface="Times New Roman" panose="02020603050405020304" pitchFamily="18" charset="0"/>
+                <a:cs typeface="Times New Roman" panose="02020603050405020304" pitchFamily="18" charset="0"/>
+              </a:rPr>
+              <a:t>Kết </a:t>
+            </a:r>
+            <a:r>
+              <a:rPr lang="en-US" sz="2800" dirty="0" err="1" smtClean="0">
+                <a:latin typeface="Times New Roman" panose="02020603050405020304" pitchFamily="18" charset="0"/>
+                <a:cs typeface="Times New Roman" panose="02020603050405020304" pitchFamily="18" charset="0"/>
+              </a:rPr>
+              <a:t>Luận</a:t>
+            </a:r>
+            <a:r>
+              <a:rPr lang="en-US" sz="2800" dirty="0" smtClean="0">
+                <a:latin typeface="Times New Roman" panose="02020603050405020304" pitchFamily="18" charset="0"/>
+                <a:cs typeface="Times New Roman" panose="02020603050405020304" pitchFamily="18" charset="0"/>
+              </a:rPr>
+              <a:t> </a:t>
+            </a:r>
+            <a:r>
+              <a:rPr lang="en-US" sz="2800" dirty="0" err="1" smtClean="0">
+                <a:latin typeface="Times New Roman" panose="02020603050405020304" pitchFamily="18" charset="0"/>
+                <a:cs typeface="Times New Roman" panose="02020603050405020304" pitchFamily="18" charset="0"/>
+              </a:rPr>
+              <a:t>Và</a:t>
+            </a:r>
+            <a:r>
+              <a:rPr lang="en-US" sz="2800" dirty="0" smtClean="0">
+                <a:latin typeface="Times New Roman" panose="02020603050405020304" pitchFamily="18" charset="0"/>
+                <a:cs typeface="Times New Roman" panose="02020603050405020304" pitchFamily="18" charset="0"/>
+              </a:rPr>
+              <a:t> </a:t>
+            </a:r>
+            <a:r>
+              <a:rPr lang="en-US" sz="2800" err="1" smtClean="0">
+                <a:latin typeface="Times New Roman" panose="02020603050405020304" pitchFamily="18" charset="0"/>
+                <a:cs typeface="Times New Roman" panose="02020603050405020304" pitchFamily="18" charset="0"/>
+              </a:rPr>
+              <a:t>Kiến</a:t>
+            </a:r>
+            <a:r>
+              <a:rPr lang="en-US" sz="2800" smtClean="0">
+                <a:latin typeface="Times New Roman" panose="02020603050405020304" pitchFamily="18" charset="0"/>
+                <a:cs typeface="Times New Roman" panose="02020603050405020304" pitchFamily="18" charset="0"/>
+              </a:rPr>
+              <a:t> Nghị</a:t>
+            </a:r>
+          </a:p>
+          <a:p>
+            <a:pPr marL="342900" indent="-342900">
+              <a:buAutoNum type="arabicPeriod"/>
+            </a:pPr>
+            <a:r>
+              <a:rPr lang="en-US" sz="2800" smtClean="0">
+                <a:latin typeface="Times New Roman" panose="02020603050405020304" pitchFamily="18" charset="0"/>
+                <a:cs typeface="Times New Roman" panose="02020603050405020304" pitchFamily="18" charset="0"/>
+              </a:rPr>
+              <a:t>Demo</a:t>
+            </a:r>
+            <a:endParaRPr lang="en-US" sz="2800" dirty="0" smtClean="0">
+              <a:latin typeface="Times New Roman" panose="02020603050405020304" pitchFamily="18" charset="0"/>
+              <a:cs typeface="Times New Roman" panose="02020603050405020304" pitchFamily="18" charset="0"/>
+            </a:endParaRPr>
+          </a:p>
+        </p:txBody>
+      </p:sp>
+    </p:spTree>
+    <p:extLst>
+      <p:ext uri="{BB962C8B-B14F-4D97-AF65-F5344CB8AC3E}">
+        <p14:creationId xmlns:p14="http://schemas.microsoft.com/office/powerpoint/2010/main" val="479250117"/>
+      </p:ext>
+    </p:extLst>
+  </p:cSld>
+  <p:clrMapOvr>
+    <a:masterClrMapping/>
+  </p:clrMapOvr>
+  <p:timing>
+    <p:tnLst>
+      <p:par>
+        <p:cTn id="1" dur="indefinite" restart="never" nodeType="tmRoot"/>
+      </p:par>
+    </p:tnLst>
+  </p:timing>
+</p:sld>
+</file>
+
+<file path=ppt/slides/slide20.xml><?xml version="1.0" encoding="utf-8"?>
+<p:sld xmlns:a="http://schemas.openxmlformats.org/drawingml/2006/main" xmlns:r="http://schemas.openxmlformats.org/officeDocument/2006/relationships" xmlns:p="http://schemas.openxmlformats.org/presentationml/2006/main">
+  <p:cSld>
+    <p:spTree>
+      <p:nvGrpSpPr>
+        <p:cNvPr id="1" name=""/>
+        <p:cNvGrpSpPr/>
+        <p:nvPr/>
+      </p:nvGrpSpPr>
+      <p:grpSpPr>
+        <a:xfrm>
+          <a:off x="0" y="0"/>
+          <a:ext cx="0" cy="0"/>
+          <a:chOff x="0" y="0"/>
+          <a:chExt cx="0" cy="0"/>
+        </a:xfrm>
+      </p:grpSpPr>
+      <p:sp>
+        <p:nvSpPr>
+          <p:cNvPr id="4" name="TextBox 3"/>
+          <p:cNvSpPr txBox="1"/>
+          <p:nvPr/>
+        </p:nvSpPr>
+        <p:spPr>
+          <a:xfrm>
+            <a:off x="88444" y="0"/>
+            <a:ext cx="5158469" cy="523220"/>
+          </a:xfrm>
+          <a:prstGeom prst="rect">
+            <a:avLst/>
+          </a:prstGeom>
+          <a:noFill/>
+        </p:spPr>
+        <p:txBody>
+          <a:bodyPr wrap="square" rtlCol="0">
+            <a:spAutoFit/>
+          </a:bodyPr>
+          <a:lstStyle/>
+          <a:p>
+            <a:r>
+              <a:rPr lang="en-US" sz="2800" err="1" smtClean="0">
+                <a:solidFill>
+                  <a:srgbClr val="FF0000"/>
+                </a:solidFill>
+                <a:latin typeface="Times New Roman" panose="02020603050405020304" pitchFamily="18" charset="0"/>
+                <a:cs typeface="Times New Roman" panose="02020603050405020304" pitchFamily="18" charset="0"/>
+              </a:rPr>
+              <a:t>Chức</a:t>
+            </a:r>
+            <a:r>
+              <a:rPr lang="en-US" sz="2800" smtClean="0">
+                <a:solidFill>
+                  <a:srgbClr val="FF0000"/>
+                </a:solidFill>
+                <a:latin typeface="Times New Roman" panose="02020603050405020304" pitchFamily="18" charset="0"/>
+                <a:cs typeface="Times New Roman" panose="02020603050405020304" pitchFamily="18" charset="0"/>
+              </a:rPr>
+              <a:t> </a:t>
+            </a:r>
+            <a:r>
+              <a:rPr lang="en-US" sz="2800" smtClean="0">
+                <a:solidFill>
+                  <a:srgbClr val="FF0000"/>
+                </a:solidFill>
+                <a:latin typeface="Times New Roman" panose="02020603050405020304" pitchFamily="18" charset="0"/>
+                <a:cs typeface="Times New Roman" panose="02020603050405020304" pitchFamily="18" charset="0"/>
+              </a:rPr>
+              <a:t>năng</a:t>
+            </a:r>
+            <a:r>
+              <a:rPr lang="en-US" sz="2800">
+                <a:solidFill>
+                  <a:srgbClr val="FF0000"/>
+                </a:solidFill>
+                <a:latin typeface="Times New Roman" panose="02020603050405020304" pitchFamily="18" charset="0"/>
+                <a:cs typeface="Times New Roman" panose="02020603050405020304" pitchFamily="18" charset="0"/>
+              </a:rPr>
+              <a:t> </a:t>
+            </a:r>
+            <a:r>
+              <a:rPr lang="en-US" sz="2800" smtClean="0">
+                <a:solidFill>
+                  <a:srgbClr val="FF0000"/>
+                </a:solidFill>
+                <a:latin typeface="Times New Roman" panose="02020603050405020304" pitchFamily="18" charset="0"/>
+                <a:cs typeface="Times New Roman" panose="02020603050405020304" pitchFamily="18" charset="0"/>
+              </a:rPr>
+              <a:t>Xóa sản phẩm</a:t>
+            </a:r>
+            <a:endParaRPr lang="en-US" sz="2800" dirty="0">
+              <a:solidFill>
+                <a:srgbClr val="FF0000"/>
+              </a:solidFill>
+              <a:latin typeface="Times New Roman" panose="02020603050405020304" pitchFamily="18" charset="0"/>
+              <a:cs typeface="Times New Roman" panose="02020603050405020304" pitchFamily="18" charset="0"/>
+            </a:endParaRPr>
+          </a:p>
+        </p:txBody>
+      </p:sp>
+      <p:pic>
+        <p:nvPicPr>
+          <p:cNvPr id="5" name="Picture 4"/>
+          <p:cNvPicPr>
+            <a:picLocks noChangeAspect="1"/>
+          </p:cNvPicPr>
+          <p:nvPr/>
+        </p:nvPicPr>
+        <p:blipFill>
+          <a:blip r:embed="rId2">
+            <a:extLst>
+              <a:ext uri="{28A0092B-C50C-407E-A947-70E740481C1C}">
+                <a14:useLocalDpi xmlns:a14="http://schemas.microsoft.com/office/drawing/2010/main" val="0"/>
+              </a:ext>
+            </a:extLst>
+          </a:blip>
+          <a:stretch>
+            <a:fillRect/>
+          </a:stretch>
+        </p:blipFill>
+        <p:spPr>
+          <a:xfrm>
+            <a:off x="8182869" y="0"/>
+            <a:ext cx="4009132" cy="6858000"/>
+          </a:xfrm>
+          <a:prstGeom prst="rect">
+            <a:avLst/>
+          </a:prstGeom>
+        </p:spPr>
+      </p:pic>
+      <p:pic>
+        <p:nvPicPr>
+          <p:cNvPr id="8" name="Picture 7"/>
+          <p:cNvPicPr>
+            <a:picLocks noChangeAspect="1"/>
+          </p:cNvPicPr>
+          <p:nvPr/>
+        </p:nvPicPr>
+        <p:blipFill>
+          <a:blip r:embed="rId3">
+            <a:extLst>
+              <a:ext uri="{28A0092B-C50C-407E-A947-70E740481C1C}">
+                <a14:useLocalDpi xmlns:a14="http://schemas.microsoft.com/office/drawing/2010/main" val="0"/>
+              </a:ext>
+            </a:extLst>
+          </a:blip>
+          <a:stretch>
+            <a:fillRect/>
+          </a:stretch>
+        </p:blipFill>
+        <p:spPr>
+          <a:xfrm>
+            <a:off x="88443" y="1230213"/>
+            <a:ext cx="7898281" cy="3401945"/>
+          </a:xfrm>
+          <a:prstGeom prst="rect">
+            <a:avLst/>
+          </a:prstGeom>
+        </p:spPr>
+      </p:pic>
+    </p:spTree>
+    <p:extLst>
+      <p:ext uri="{BB962C8B-B14F-4D97-AF65-F5344CB8AC3E}">
+        <p14:creationId xmlns:p14="http://schemas.microsoft.com/office/powerpoint/2010/main" val="1349627515"/>
+      </p:ext>
+    </p:extLst>
+  </p:cSld>
+  <p:clrMapOvr>
+    <a:masterClrMapping/>
+  </p:clrMapOvr>
+</p:sld>
+</file>
+
+<file path=ppt/slides/slide21.xml><?xml version="1.0" encoding="utf-8"?>
+<p:sld xmlns:a="http://schemas.openxmlformats.org/drawingml/2006/main" xmlns:r="http://schemas.openxmlformats.org/officeDocument/2006/relationships" xmlns:p="http://schemas.openxmlformats.org/presentationml/2006/main">
+  <p:cSld>
+    <p:spTree>
+      <p:nvGrpSpPr>
+        <p:cNvPr id="1" name=""/>
+        <p:cNvGrpSpPr/>
+        <p:nvPr/>
+      </p:nvGrpSpPr>
+      <p:grpSpPr>
+        <a:xfrm>
+          <a:off x="0" y="0"/>
+          <a:ext cx="0" cy="0"/>
+          <a:chOff x="0" y="0"/>
+          <a:chExt cx="0" cy="0"/>
+        </a:xfrm>
+      </p:grpSpPr>
       <p:pic>
         <p:nvPicPr>
           <p:cNvPr id="9218" name="Picture 2" descr="3"/>
@@ -9141,7 +10236,7 @@
 </p:sld>
 </file>
 
-<file path=ppt/slides/slide19.xml><?xml version="1.0" encoding="utf-8"?>
+<file path=ppt/slides/slide22.xml><?xml version="1.0" encoding="utf-8"?>
 <p:sld xmlns:a="http://schemas.openxmlformats.org/drawingml/2006/main" xmlns:r="http://schemas.openxmlformats.org/officeDocument/2006/relationships" xmlns:p="http://schemas.openxmlformats.org/presentationml/2006/main">
   <p:cSld>
     <p:spTree>
@@ -9352,502 +10447,7 @@
 </p:sld>
 </file>
 
-<file path=ppt/slides/slide2.xml><?xml version="1.0" encoding="utf-8"?>
-<p:sld xmlns:a="http://schemas.openxmlformats.org/drawingml/2006/main" xmlns:r="http://schemas.openxmlformats.org/officeDocument/2006/relationships" xmlns:p="http://schemas.openxmlformats.org/presentationml/2006/main">
-  <p:cSld>
-    <p:spTree>
-      <p:nvGrpSpPr>
-        <p:cNvPr id="1" name=""/>
-        <p:cNvGrpSpPr/>
-        <p:nvPr/>
-      </p:nvGrpSpPr>
-      <p:grpSpPr>
-        <a:xfrm>
-          <a:off x="0" y="0"/>
-          <a:ext cx="0" cy="0"/>
-          <a:chOff x="0" y="0"/>
-          <a:chExt cx="0" cy="0"/>
-        </a:xfrm>
-      </p:grpSpPr>
-      <p:sp>
-        <p:nvSpPr>
-          <p:cNvPr id="4" name="TextBox 3"/>
-          <p:cNvSpPr txBox="1"/>
-          <p:nvPr/>
-        </p:nvSpPr>
-        <p:spPr>
-          <a:xfrm>
-            <a:off x="544286" y="664028"/>
-            <a:ext cx="8338457" cy="3539430"/>
-          </a:xfrm>
-          <a:prstGeom prst="rect">
-            <a:avLst/>
-          </a:prstGeom>
-          <a:noFill/>
-        </p:spPr>
-        <p:txBody>
-          <a:bodyPr wrap="square" rtlCol="0">
-            <a:spAutoFit/>
-          </a:bodyPr>
-          <a:lstStyle/>
-          <a:p>
-            <a:r>
-              <a:rPr lang="en-US" sz="2800" dirty="0" err="1" smtClean="0">
-                <a:latin typeface="Times New Roman" panose="02020603050405020304" pitchFamily="18" charset="0"/>
-                <a:cs typeface="Times New Roman" panose="02020603050405020304" pitchFamily="18" charset="0"/>
-              </a:rPr>
-              <a:t>Mục</a:t>
-            </a:r>
-            <a:r>
-              <a:rPr lang="en-US" sz="2800" dirty="0" smtClean="0">
-                <a:latin typeface="Times New Roman" panose="02020603050405020304" pitchFamily="18" charset="0"/>
-                <a:cs typeface="Times New Roman" panose="02020603050405020304" pitchFamily="18" charset="0"/>
-              </a:rPr>
-              <a:t> </a:t>
-            </a:r>
-            <a:r>
-              <a:rPr lang="en-US" sz="2800" dirty="0" err="1" smtClean="0">
-                <a:latin typeface="Times New Roman" panose="02020603050405020304" pitchFamily="18" charset="0"/>
-                <a:cs typeface="Times New Roman" panose="02020603050405020304" pitchFamily="18" charset="0"/>
-              </a:rPr>
-              <a:t>Lục</a:t>
-            </a:r>
-            <a:endParaRPr lang="en-US" sz="2800" dirty="0" smtClean="0">
-              <a:latin typeface="Times New Roman" panose="02020603050405020304" pitchFamily="18" charset="0"/>
-              <a:cs typeface="Times New Roman" panose="02020603050405020304" pitchFamily="18" charset="0"/>
-            </a:endParaRPr>
-          </a:p>
-          <a:p>
-            <a:pPr marL="342900" indent="-342900">
-              <a:buAutoNum type="arabicPeriod"/>
-            </a:pPr>
-            <a:r>
-              <a:rPr lang="en-US" sz="2800" dirty="0" err="1" smtClean="0">
-                <a:latin typeface="Times New Roman" panose="02020603050405020304" pitchFamily="18" charset="0"/>
-                <a:cs typeface="Times New Roman" panose="02020603050405020304" pitchFamily="18" charset="0"/>
-              </a:rPr>
-              <a:t>Giới</a:t>
-            </a:r>
-            <a:r>
-              <a:rPr lang="en-US" sz="2800" dirty="0" smtClean="0">
-                <a:latin typeface="Times New Roman" panose="02020603050405020304" pitchFamily="18" charset="0"/>
-                <a:cs typeface="Times New Roman" panose="02020603050405020304" pitchFamily="18" charset="0"/>
-              </a:rPr>
-              <a:t> </a:t>
-            </a:r>
-            <a:r>
-              <a:rPr lang="en-US" sz="2800" dirty="0" err="1" smtClean="0">
-                <a:latin typeface="Times New Roman" panose="02020603050405020304" pitchFamily="18" charset="0"/>
-                <a:cs typeface="Times New Roman" panose="02020603050405020304" pitchFamily="18" charset="0"/>
-              </a:rPr>
-              <a:t>Thiệu</a:t>
-            </a:r>
-            <a:r>
-              <a:rPr lang="en-US" sz="2800" dirty="0" smtClean="0">
-                <a:latin typeface="Times New Roman" panose="02020603050405020304" pitchFamily="18" charset="0"/>
-                <a:cs typeface="Times New Roman" panose="02020603050405020304" pitchFamily="18" charset="0"/>
-              </a:rPr>
-              <a:t> </a:t>
-            </a:r>
-            <a:r>
-              <a:rPr lang="en-US" sz="2800" dirty="0" err="1" smtClean="0">
-                <a:latin typeface="Times New Roman" panose="02020603050405020304" pitchFamily="18" charset="0"/>
-                <a:cs typeface="Times New Roman" panose="02020603050405020304" pitchFamily="18" charset="0"/>
-              </a:rPr>
-              <a:t>Đồ</a:t>
-            </a:r>
-            <a:r>
-              <a:rPr lang="en-US" sz="2800" dirty="0" smtClean="0">
-                <a:latin typeface="Times New Roman" panose="02020603050405020304" pitchFamily="18" charset="0"/>
-                <a:cs typeface="Times New Roman" panose="02020603050405020304" pitchFamily="18" charset="0"/>
-              </a:rPr>
-              <a:t> </a:t>
-            </a:r>
-            <a:r>
-              <a:rPr lang="en-US" sz="2800" dirty="0" err="1" smtClean="0">
-                <a:latin typeface="Times New Roman" panose="02020603050405020304" pitchFamily="18" charset="0"/>
-                <a:cs typeface="Times New Roman" panose="02020603050405020304" pitchFamily="18" charset="0"/>
-              </a:rPr>
-              <a:t>Án</a:t>
-            </a:r>
-            <a:endParaRPr lang="en-US" sz="2800" dirty="0" smtClean="0">
-              <a:latin typeface="Times New Roman" panose="02020603050405020304" pitchFamily="18" charset="0"/>
-              <a:cs typeface="Times New Roman" panose="02020603050405020304" pitchFamily="18" charset="0"/>
-            </a:endParaRPr>
-          </a:p>
-          <a:p>
-            <a:pPr marL="342900" indent="-342900">
-              <a:buAutoNum type="arabicPeriod"/>
-            </a:pPr>
-            <a:r>
-              <a:rPr lang="en-US" sz="2800" dirty="0" err="1" smtClean="0">
-                <a:latin typeface="Times New Roman" panose="02020603050405020304" pitchFamily="18" charset="0"/>
-                <a:cs typeface="Times New Roman" panose="02020603050405020304" pitchFamily="18" charset="0"/>
-              </a:rPr>
-              <a:t>Phân</a:t>
-            </a:r>
-            <a:r>
-              <a:rPr lang="en-US" sz="2800" dirty="0" smtClean="0">
-                <a:latin typeface="Times New Roman" panose="02020603050405020304" pitchFamily="18" charset="0"/>
-                <a:cs typeface="Times New Roman" panose="02020603050405020304" pitchFamily="18" charset="0"/>
-              </a:rPr>
-              <a:t> </a:t>
-            </a:r>
-            <a:r>
-              <a:rPr lang="en-US" sz="2800" dirty="0" err="1" smtClean="0">
-                <a:latin typeface="Times New Roman" panose="02020603050405020304" pitchFamily="18" charset="0"/>
-                <a:cs typeface="Times New Roman" panose="02020603050405020304" pitchFamily="18" charset="0"/>
-              </a:rPr>
-              <a:t>Tích</a:t>
-            </a:r>
-            <a:r>
-              <a:rPr lang="en-US" sz="2800" dirty="0" smtClean="0">
-                <a:latin typeface="Times New Roman" panose="02020603050405020304" pitchFamily="18" charset="0"/>
-                <a:cs typeface="Times New Roman" panose="02020603050405020304" pitchFamily="18" charset="0"/>
-              </a:rPr>
-              <a:t> </a:t>
-            </a:r>
-            <a:r>
-              <a:rPr lang="en-US" sz="2800" dirty="0" err="1" smtClean="0">
-                <a:latin typeface="Times New Roman" panose="02020603050405020304" pitchFamily="18" charset="0"/>
-                <a:cs typeface="Times New Roman" panose="02020603050405020304" pitchFamily="18" charset="0"/>
-              </a:rPr>
-              <a:t>Thiết</a:t>
-            </a:r>
-            <a:r>
-              <a:rPr lang="en-US" sz="2800" dirty="0" smtClean="0">
-                <a:latin typeface="Times New Roman" panose="02020603050405020304" pitchFamily="18" charset="0"/>
-                <a:cs typeface="Times New Roman" panose="02020603050405020304" pitchFamily="18" charset="0"/>
-              </a:rPr>
-              <a:t> </a:t>
-            </a:r>
-            <a:r>
-              <a:rPr lang="en-US" sz="2800" dirty="0" err="1" smtClean="0">
-                <a:latin typeface="Times New Roman" panose="02020603050405020304" pitchFamily="18" charset="0"/>
-                <a:cs typeface="Times New Roman" panose="02020603050405020304" pitchFamily="18" charset="0"/>
-              </a:rPr>
-              <a:t>Kế</a:t>
-            </a:r>
-            <a:r>
-              <a:rPr lang="en-US" sz="2800" dirty="0" smtClean="0">
-                <a:latin typeface="Times New Roman" panose="02020603050405020304" pitchFamily="18" charset="0"/>
-                <a:cs typeface="Times New Roman" panose="02020603050405020304" pitchFamily="18" charset="0"/>
-              </a:rPr>
-              <a:t> </a:t>
-            </a:r>
-            <a:r>
-              <a:rPr lang="en-US" sz="2800" dirty="0" err="1" smtClean="0">
-                <a:latin typeface="Times New Roman" panose="02020603050405020304" pitchFamily="18" charset="0"/>
-                <a:cs typeface="Times New Roman" panose="02020603050405020304" pitchFamily="18" charset="0"/>
-              </a:rPr>
-              <a:t>Cơ</a:t>
-            </a:r>
-            <a:r>
-              <a:rPr lang="en-US" sz="2800" dirty="0" smtClean="0">
-                <a:latin typeface="Times New Roman" panose="02020603050405020304" pitchFamily="18" charset="0"/>
-                <a:cs typeface="Times New Roman" panose="02020603050405020304" pitchFamily="18" charset="0"/>
-              </a:rPr>
-              <a:t> </a:t>
-            </a:r>
-            <a:r>
-              <a:rPr lang="en-US" sz="2800" dirty="0" err="1" smtClean="0">
-                <a:latin typeface="Times New Roman" panose="02020603050405020304" pitchFamily="18" charset="0"/>
-                <a:cs typeface="Times New Roman" panose="02020603050405020304" pitchFamily="18" charset="0"/>
-              </a:rPr>
-              <a:t>Sở</a:t>
-            </a:r>
-            <a:r>
-              <a:rPr lang="en-US" sz="2800" dirty="0" smtClean="0">
-                <a:latin typeface="Times New Roman" panose="02020603050405020304" pitchFamily="18" charset="0"/>
-                <a:cs typeface="Times New Roman" panose="02020603050405020304" pitchFamily="18" charset="0"/>
-              </a:rPr>
-              <a:t> </a:t>
-            </a:r>
-            <a:r>
-              <a:rPr lang="en-US" sz="2800" dirty="0" err="1" smtClean="0">
-                <a:latin typeface="Times New Roman" panose="02020603050405020304" pitchFamily="18" charset="0"/>
-                <a:cs typeface="Times New Roman" panose="02020603050405020304" pitchFamily="18" charset="0"/>
-              </a:rPr>
-              <a:t>Dữ</a:t>
-            </a:r>
-            <a:r>
-              <a:rPr lang="en-US" sz="2800" dirty="0" smtClean="0">
-                <a:latin typeface="Times New Roman" panose="02020603050405020304" pitchFamily="18" charset="0"/>
-                <a:cs typeface="Times New Roman" panose="02020603050405020304" pitchFamily="18" charset="0"/>
-              </a:rPr>
-              <a:t> </a:t>
-            </a:r>
-            <a:r>
-              <a:rPr lang="en-US" sz="2800" dirty="0" err="1" smtClean="0">
-                <a:latin typeface="Times New Roman" panose="02020603050405020304" pitchFamily="18" charset="0"/>
-                <a:cs typeface="Times New Roman" panose="02020603050405020304" pitchFamily="18" charset="0"/>
-              </a:rPr>
-              <a:t>Liệu</a:t>
-            </a:r>
-            <a:endParaRPr lang="en-US" sz="2800" dirty="0" smtClean="0">
-              <a:latin typeface="Times New Roman" panose="02020603050405020304" pitchFamily="18" charset="0"/>
-              <a:cs typeface="Times New Roman" panose="02020603050405020304" pitchFamily="18" charset="0"/>
-            </a:endParaRPr>
-          </a:p>
-          <a:p>
-            <a:pPr marL="342900" indent="-342900">
-              <a:buAutoNum type="arabicPeriod"/>
-            </a:pPr>
-            <a:r>
-              <a:rPr lang="en-US" sz="2800" dirty="0" err="1" smtClean="0">
-                <a:latin typeface="Times New Roman" panose="02020603050405020304" pitchFamily="18" charset="0"/>
-                <a:cs typeface="Times New Roman" panose="02020603050405020304" pitchFamily="18" charset="0"/>
-              </a:rPr>
-              <a:t>Hoạt</a:t>
-            </a:r>
-            <a:r>
-              <a:rPr lang="en-US" sz="2800" dirty="0" smtClean="0">
-                <a:latin typeface="Times New Roman" panose="02020603050405020304" pitchFamily="18" charset="0"/>
-                <a:cs typeface="Times New Roman" panose="02020603050405020304" pitchFamily="18" charset="0"/>
-              </a:rPr>
-              <a:t> </a:t>
-            </a:r>
-            <a:r>
-              <a:rPr lang="en-US" sz="2800" dirty="0" err="1" smtClean="0">
-                <a:latin typeface="Times New Roman" panose="02020603050405020304" pitchFamily="18" charset="0"/>
-                <a:cs typeface="Times New Roman" panose="02020603050405020304" pitchFamily="18" charset="0"/>
-              </a:rPr>
-              <a:t>Động</a:t>
-            </a:r>
-            <a:r>
-              <a:rPr lang="en-US" sz="2800" dirty="0" smtClean="0">
-                <a:latin typeface="Times New Roman" panose="02020603050405020304" pitchFamily="18" charset="0"/>
-                <a:cs typeface="Times New Roman" panose="02020603050405020304" pitchFamily="18" charset="0"/>
-              </a:rPr>
-              <a:t> (</a:t>
-            </a:r>
-            <a:r>
-              <a:rPr lang="en-US" sz="2800" dirty="0" err="1" smtClean="0">
-                <a:latin typeface="Times New Roman" panose="02020603050405020304" pitchFamily="18" charset="0"/>
-                <a:cs typeface="Times New Roman" panose="02020603050405020304" pitchFamily="18" charset="0"/>
-              </a:rPr>
-              <a:t>Acivity</a:t>
-            </a:r>
-            <a:r>
-              <a:rPr lang="en-US" sz="2800" dirty="0" smtClean="0">
-                <a:latin typeface="Times New Roman" panose="02020603050405020304" pitchFamily="18" charset="0"/>
-                <a:cs typeface="Times New Roman" panose="02020603050405020304" pitchFamily="18" charset="0"/>
-              </a:rPr>
-              <a:t>)</a:t>
-            </a:r>
-          </a:p>
-          <a:p>
-            <a:pPr marL="342900" indent="-342900">
-              <a:buAutoNum type="arabicPeriod"/>
-            </a:pPr>
-            <a:r>
-              <a:rPr lang="en-US" sz="2800" dirty="0" err="1" smtClean="0">
-                <a:latin typeface="Times New Roman" panose="02020603050405020304" pitchFamily="18" charset="0"/>
-                <a:cs typeface="Times New Roman" panose="02020603050405020304" pitchFamily="18" charset="0"/>
-              </a:rPr>
-              <a:t>Công</a:t>
-            </a:r>
-            <a:r>
-              <a:rPr lang="en-US" sz="2800" dirty="0" smtClean="0">
-                <a:latin typeface="Times New Roman" panose="02020603050405020304" pitchFamily="18" charset="0"/>
-                <a:cs typeface="Times New Roman" panose="02020603050405020304" pitchFamily="18" charset="0"/>
-              </a:rPr>
-              <a:t> </a:t>
-            </a:r>
-            <a:r>
-              <a:rPr lang="en-US" sz="2800" dirty="0" err="1" smtClean="0">
-                <a:latin typeface="Times New Roman" panose="02020603050405020304" pitchFamily="18" charset="0"/>
-                <a:cs typeface="Times New Roman" panose="02020603050405020304" pitchFamily="18" charset="0"/>
-              </a:rPr>
-              <a:t>Nghệ</a:t>
-            </a:r>
-            <a:r>
-              <a:rPr lang="en-US" sz="2800" dirty="0" smtClean="0">
-                <a:latin typeface="Times New Roman" panose="02020603050405020304" pitchFamily="18" charset="0"/>
-                <a:cs typeface="Times New Roman" panose="02020603050405020304" pitchFamily="18" charset="0"/>
-              </a:rPr>
-              <a:t> </a:t>
-            </a:r>
-            <a:r>
-              <a:rPr lang="en-US" sz="2800" dirty="0" err="1" smtClean="0">
-                <a:latin typeface="Times New Roman" panose="02020603050405020304" pitchFamily="18" charset="0"/>
-                <a:cs typeface="Times New Roman" panose="02020603050405020304" pitchFamily="18" charset="0"/>
-              </a:rPr>
-              <a:t>Sử</a:t>
-            </a:r>
-            <a:r>
-              <a:rPr lang="en-US" sz="2800" dirty="0" smtClean="0">
-                <a:latin typeface="Times New Roman" panose="02020603050405020304" pitchFamily="18" charset="0"/>
-                <a:cs typeface="Times New Roman" panose="02020603050405020304" pitchFamily="18" charset="0"/>
-              </a:rPr>
-              <a:t> </a:t>
-            </a:r>
-            <a:r>
-              <a:rPr lang="en-US" sz="2800" dirty="0" err="1" smtClean="0">
-                <a:latin typeface="Times New Roman" panose="02020603050405020304" pitchFamily="18" charset="0"/>
-                <a:cs typeface="Times New Roman" panose="02020603050405020304" pitchFamily="18" charset="0"/>
-              </a:rPr>
-              <a:t>Dụng</a:t>
-            </a:r>
-            <a:endParaRPr lang="en-US" sz="2800" dirty="0" smtClean="0">
-              <a:latin typeface="Times New Roman" panose="02020603050405020304" pitchFamily="18" charset="0"/>
-              <a:cs typeface="Times New Roman" panose="02020603050405020304" pitchFamily="18" charset="0"/>
-            </a:endParaRPr>
-          </a:p>
-          <a:p>
-            <a:pPr marL="342900" indent="-342900">
-              <a:buAutoNum type="arabicPeriod"/>
-            </a:pPr>
-            <a:r>
-              <a:rPr lang="en-US" sz="2800" dirty="0" err="1" smtClean="0">
-                <a:latin typeface="Times New Roman" panose="02020603050405020304" pitchFamily="18" charset="0"/>
-                <a:cs typeface="Times New Roman" panose="02020603050405020304" pitchFamily="18" charset="0"/>
-              </a:rPr>
-              <a:t>Triển</a:t>
-            </a:r>
-            <a:r>
-              <a:rPr lang="en-US" sz="2800" dirty="0" smtClean="0">
-                <a:latin typeface="Times New Roman" panose="02020603050405020304" pitchFamily="18" charset="0"/>
-                <a:cs typeface="Times New Roman" panose="02020603050405020304" pitchFamily="18" charset="0"/>
-              </a:rPr>
-              <a:t> </a:t>
-            </a:r>
-            <a:r>
-              <a:rPr lang="en-US" sz="2800" dirty="0" err="1" smtClean="0">
-                <a:latin typeface="Times New Roman" panose="02020603050405020304" pitchFamily="18" charset="0"/>
-                <a:cs typeface="Times New Roman" panose="02020603050405020304" pitchFamily="18" charset="0"/>
-              </a:rPr>
-              <a:t>Khai</a:t>
-            </a:r>
-            <a:r>
-              <a:rPr lang="en-US" sz="2800" dirty="0" smtClean="0">
-                <a:latin typeface="Times New Roman" panose="02020603050405020304" pitchFamily="18" charset="0"/>
-                <a:cs typeface="Times New Roman" panose="02020603050405020304" pitchFamily="18" charset="0"/>
-              </a:rPr>
-              <a:t> </a:t>
-            </a:r>
-            <a:r>
-              <a:rPr lang="en-US" sz="2800" err="1" smtClean="0">
-                <a:latin typeface="Times New Roman" panose="02020603050405020304" pitchFamily="18" charset="0"/>
-                <a:cs typeface="Times New Roman" panose="02020603050405020304" pitchFamily="18" charset="0"/>
-              </a:rPr>
-              <a:t>Ứng</a:t>
-            </a:r>
-            <a:r>
-              <a:rPr lang="en-US" sz="2800" smtClean="0">
-                <a:latin typeface="Times New Roman" panose="02020603050405020304" pitchFamily="18" charset="0"/>
-                <a:cs typeface="Times New Roman" panose="02020603050405020304" pitchFamily="18" charset="0"/>
-              </a:rPr>
-              <a:t> </a:t>
-            </a:r>
-            <a:r>
-              <a:rPr lang="en-US" sz="2800" smtClean="0">
-                <a:latin typeface="Times New Roman" panose="02020603050405020304" pitchFamily="18" charset="0"/>
-                <a:cs typeface="Times New Roman" panose="02020603050405020304" pitchFamily="18" charset="0"/>
-              </a:rPr>
-              <a:t>Dụng</a:t>
-            </a:r>
-          </a:p>
-          <a:p>
-            <a:pPr marL="342900" indent="-342900">
-              <a:buAutoNum type="arabicPeriod"/>
-            </a:pPr>
-            <a:r>
-              <a:rPr lang="en-US" sz="2800" smtClean="0">
-                <a:latin typeface="Times New Roman" panose="02020603050405020304" pitchFamily="18" charset="0"/>
-                <a:cs typeface="Times New Roman" panose="02020603050405020304" pitchFamily="18" charset="0"/>
-              </a:rPr>
-              <a:t>Kết </a:t>
-            </a:r>
-            <a:r>
-              <a:rPr lang="en-US" sz="2800" dirty="0" err="1" smtClean="0">
-                <a:latin typeface="Times New Roman" panose="02020603050405020304" pitchFamily="18" charset="0"/>
-                <a:cs typeface="Times New Roman" panose="02020603050405020304" pitchFamily="18" charset="0"/>
-              </a:rPr>
-              <a:t>Luận</a:t>
-            </a:r>
-            <a:r>
-              <a:rPr lang="en-US" sz="2800" dirty="0" smtClean="0">
-                <a:latin typeface="Times New Roman" panose="02020603050405020304" pitchFamily="18" charset="0"/>
-                <a:cs typeface="Times New Roman" panose="02020603050405020304" pitchFamily="18" charset="0"/>
-              </a:rPr>
-              <a:t> </a:t>
-            </a:r>
-            <a:r>
-              <a:rPr lang="en-US" sz="2800" dirty="0" err="1" smtClean="0">
-                <a:latin typeface="Times New Roman" panose="02020603050405020304" pitchFamily="18" charset="0"/>
-                <a:cs typeface="Times New Roman" panose="02020603050405020304" pitchFamily="18" charset="0"/>
-              </a:rPr>
-              <a:t>Và</a:t>
-            </a:r>
-            <a:r>
-              <a:rPr lang="en-US" sz="2800" dirty="0" smtClean="0">
-                <a:latin typeface="Times New Roman" panose="02020603050405020304" pitchFamily="18" charset="0"/>
-                <a:cs typeface="Times New Roman" panose="02020603050405020304" pitchFamily="18" charset="0"/>
-              </a:rPr>
-              <a:t> </a:t>
-            </a:r>
-            <a:r>
-              <a:rPr lang="en-US" sz="2800" err="1" smtClean="0">
-                <a:latin typeface="Times New Roman" panose="02020603050405020304" pitchFamily="18" charset="0"/>
-                <a:cs typeface="Times New Roman" panose="02020603050405020304" pitchFamily="18" charset="0"/>
-              </a:rPr>
-              <a:t>Kiến</a:t>
-            </a:r>
-            <a:r>
-              <a:rPr lang="en-US" sz="2800" smtClean="0">
-                <a:latin typeface="Times New Roman" panose="02020603050405020304" pitchFamily="18" charset="0"/>
-                <a:cs typeface="Times New Roman" panose="02020603050405020304" pitchFamily="18" charset="0"/>
-              </a:rPr>
-              <a:t> </a:t>
-            </a:r>
-            <a:r>
-              <a:rPr lang="en-US" sz="2800" smtClean="0">
-                <a:latin typeface="Times New Roman" panose="02020603050405020304" pitchFamily="18" charset="0"/>
-                <a:cs typeface="Times New Roman" panose="02020603050405020304" pitchFamily="18" charset="0"/>
-              </a:rPr>
-              <a:t>Nghị</a:t>
-            </a:r>
-          </a:p>
-          <a:p>
-            <a:pPr marL="342900" indent="-342900">
-              <a:buAutoNum type="arabicPeriod"/>
-            </a:pPr>
-            <a:r>
-              <a:rPr lang="en-US" sz="2800" smtClean="0">
-                <a:latin typeface="Times New Roman" panose="02020603050405020304" pitchFamily="18" charset="0"/>
-                <a:cs typeface="Times New Roman" panose="02020603050405020304" pitchFamily="18" charset="0"/>
-              </a:rPr>
-              <a:t>Demo</a:t>
-            </a:r>
-            <a:endParaRPr lang="en-US" sz="2800" dirty="0" smtClean="0">
-              <a:latin typeface="Times New Roman" panose="02020603050405020304" pitchFamily="18" charset="0"/>
-              <a:cs typeface="Times New Roman" panose="02020603050405020304" pitchFamily="18" charset="0"/>
-            </a:endParaRPr>
-          </a:p>
-        </p:txBody>
-      </p:sp>
-    </p:spTree>
-    <p:extLst>
-      <p:ext uri="{BB962C8B-B14F-4D97-AF65-F5344CB8AC3E}">
-        <p14:creationId xmlns:p14="http://schemas.microsoft.com/office/powerpoint/2010/main" val="479250117"/>
-      </p:ext>
-    </p:extLst>
-  </p:cSld>
-  <p:clrMapOvr>
-    <a:masterClrMapping/>
-  </p:clrMapOvr>
-  <p:timing>
-    <p:tnLst>
-      <p:par>
-        <p:cTn id="1" dur="indefinite" restart="never" nodeType="tmRoot"/>
-      </p:par>
-    </p:tnLst>
-  </p:timing>
-</p:sld>
-</file>
-
-<file path=ppt/slides/slide20.xml><?xml version="1.0" encoding="utf-8"?>
+<file path=ppt/slides/slide23.xml><?xml version="1.0" encoding="utf-8"?>
 <p:sld xmlns:a="http://schemas.openxmlformats.org/drawingml/2006/main" xmlns:r="http://schemas.openxmlformats.org/officeDocument/2006/relationships" xmlns:p="http://schemas.openxmlformats.org/presentationml/2006/main">
   <p:cSld>
     <p:spTree>
@@ -10043,14 +10643,7 @@
                 <a:latin typeface="Times New Roman" panose="02020603050405020304" pitchFamily="18" charset="0"/>
                 <a:cs typeface="Times New Roman" panose="02020603050405020304" pitchFamily="18" charset="0"/>
               </a:rPr>
-              <a:t>Học được cách tương tác giữa các thành viên trong nhóm và giải quyết </a:t>
-            </a:r>
-            <a:r>
-              <a:rPr lang="en-US" sz="2000">
-                <a:latin typeface="Times New Roman" panose="02020603050405020304" pitchFamily="18" charset="0"/>
-                <a:cs typeface="Times New Roman" panose="02020603050405020304" pitchFamily="18" charset="0"/>
-              </a:rPr>
-              <a:t>vấn </a:t>
+              <a:t>Học được cách tương tác giữa các thành viên trong nhóm và giải quyết vấn </a:t>
             </a:r>
             <a:r>
               <a:rPr lang="en-US" sz="2000" smtClean="0">
@@ -10077,35 +10670,21 @@
                 <a:latin typeface="Times New Roman" panose="02020603050405020304" pitchFamily="18" charset="0"/>
                 <a:cs typeface="Times New Roman" panose="02020603050405020304" pitchFamily="18" charset="0"/>
               </a:rPr>
-              <a:t>được cách sử </a:t>
+              <a:t>được cách sử dụng </a:t>
+            </a:r>
+            <a:r>
+              <a:rPr lang="en-US" sz="2000" smtClean="0">
+                <a:latin typeface="Times New Roman" panose="02020603050405020304" pitchFamily="18" charset="0"/>
+                <a:cs typeface="Times New Roman" panose="02020603050405020304" pitchFamily="18" charset="0"/>
+              </a:rPr>
+              <a:t>Github </a:t>
             </a:r>
             <a:r>
               <a:rPr lang="en-US" sz="2000">
                 <a:latin typeface="Times New Roman" panose="02020603050405020304" pitchFamily="18" charset="0"/>
                 <a:cs typeface="Times New Roman" panose="02020603050405020304" pitchFamily="18" charset="0"/>
               </a:rPr>
-              <a:t>dụng </a:t>
-            </a:r>
-            <a:r>
-              <a:rPr lang="en-US" sz="2000" smtClean="0">
-                <a:latin typeface="Times New Roman" panose="02020603050405020304" pitchFamily="18" charset="0"/>
-                <a:cs typeface="Times New Roman" panose="02020603050405020304" pitchFamily="18" charset="0"/>
-              </a:rPr>
-              <a:t>Github </a:t>
-            </a:r>
-            <a:r>
-              <a:rPr lang="en-US" sz="2000">
-                <a:latin typeface="Times New Roman" panose="02020603050405020304" pitchFamily="18" charset="0"/>
-                <a:cs typeface="Times New Roman" panose="02020603050405020304" pitchFamily="18" charset="0"/>
-              </a:rPr>
-              <a:t>&amp; Trello để quản </a:t>
-            </a:r>
-            <a:r>
-              <a:rPr lang="en-US" sz="2000">
-                <a:latin typeface="Times New Roman" panose="02020603050405020304" pitchFamily="18" charset="0"/>
-                <a:cs typeface="Times New Roman" panose="02020603050405020304" pitchFamily="18" charset="0"/>
-              </a:rPr>
-              <a:t>lý </a:t>
+              <a:t>&amp; Trello để quản lý </a:t>
             </a:r>
             <a:r>
               <a:rPr lang="en-US" sz="2000" smtClean="0">
@@ -10215,56 +10794,42 @@
                 <a:latin typeface="Times New Roman" panose="02020603050405020304" pitchFamily="18" charset="0"/>
                 <a:cs typeface="Times New Roman" panose="02020603050405020304" pitchFamily="18" charset="0"/>
               </a:rPr>
-              <a:t> </a:t>
+              <a:t> giá và </a:t>
+            </a:r>
+            <a:r>
+              <a:rPr lang="en-US" dirty="0" smtClean="0">
+                <a:latin typeface="Times New Roman" panose="02020603050405020304" pitchFamily="18" charset="0"/>
+                <a:cs typeface="Times New Roman" panose="02020603050405020304" pitchFamily="18" charset="0"/>
+              </a:rPr>
+              <a:t>comment </a:t>
+            </a:r>
+            <a:r>
+              <a:rPr lang="en-US" dirty="0" err="1" smtClean="0">
+                <a:latin typeface="Times New Roman" panose="02020603050405020304" pitchFamily="18" charset="0"/>
+                <a:cs typeface="Times New Roman" panose="02020603050405020304" pitchFamily="18" charset="0"/>
+              </a:rPr>
+              <a:t>về</a:t>
+            </a:r>
+            <a:r>
+              <a:rPr lang="en-US" dirty="0" smtClean="0">
+                <a:latin typeface="Times New Roman" panose="02020603050405020304" pitchFamily="18" charset="0"/>
+                <a:cs typeface="Times New Roman" panose="02020603050405020304" pitchFamily="18" charset="0"/>
+              </a:rPr>
+              <a:t> </a:t>
+            </a:r>
+            <a:r>
+              <a:rPr lang="en-US" err="1" smtClean="0">
+                <a:latin typeface="Times New Roman" panose="02020603050405020304" pitchFamily="18" charset="0"/>
+                <a:cs typeface="Times New Roman" panose="02020603050405020304" pitchFamily="18" charset="0"/>
+              </a:rPr>
+              <a:t>sản</a:t>
             </a:r>
             <a:r>
               <a:rPr lang="en-US" smtClean="0">
                 <a:latin typeface="Times New Roman" panose="02020603050405020304" pitchFamily="18" charset="0"/>
                 <a:cs typeface="Times New Roman" panose="02020603050405020304" pitchFamily="18" charset="0"/>
               </a:rPr>
-              <a:t>giá và </a:t>
-            </a:r>
-            <a:r>
-              <a:rPr lang="en-US" dirty="0" smtClean="0">
-                <a:latin typeface="Times New Roman" panose="02020603050405020304" pitchFamily="18" charset="0"/>
-                <a:cs typeface="Times New Roman" panose="02020603050405020304" pitchFamily="18" charset="0"/>
-              </a:rPr>
-              <a:t>comment </a:t>
-            </a:r>
-            <a:r>
-              <a:rPr lang="en-US" dirty="0" err="1" smtClean="0">
-                <a:latin typeface="Times New Roman" panose="02020603050405020304" pitchFamily="18" charset="0"/>
-                <a:cs typeface="Times New Roman" panose="02020603050405020304" pitchFamily="18" charset="0"/>
-              </a:rPr>
-              <a:t>về</a:t>
-            </a:r>
-            <a:r>
-              <a:rPr lang="en-US" dirty="0" smtClean="0">
-                <a:latin typeface="Times New Roman" panose="02020603050405020304" pitchFamily="18" charset="0"/>
-                <a:cs typeface="Times New Roman" panose="02020603050405020304" pitchFamily="18" charset="0"/>
-              </a:rPr>
-              <a:t> </a:t>
-            </a:r>
-            <a:r>
-              <a:rPr lang="en-US" err="1" smtClean="0">
-                <a:latin typeface="Times New Roman" panose="02020603050405020304" pitchFamily="18" charset="0"/>
-                <a:cs typeface="Times New Roman" panose="02020603050405020304" pitchFamily="18" charset="0"/>
-              </a:rPr>
-              <a:t>sản</a:t>
-            </a:r>
-            <a:r>
-              <a:rPr lang="en-US" smtClean="0">
-                <a:latin typeface="Times New Roman" panose="02020603050405020304" pitchFamily="18" charset="0"/>
-                <a:cs typeface="Times New Roman" panose="02020603050405020304" pitchFamily="18" charset="0"/>
-              </a:rPr>
-              <a:t> </a:t>
-            </a:r>
-            <a:r>
-              <a:rPr lang="en-US" smtClean="0">
-                <a:latin typeface="Times New Roman" panose="02020603050405020304" pitchFamily="18" charset="0"/>
-                <a:cs typeface="Times New Roman" panose="02020603050405020304" pitchFamily="18" charset="0"/>
-              </a:rPr>
-              <a:t>phẩm</a:t>
+              <a:t> phẩm</a:t>
             </a:r>
           </a:p>
           <a:p>
@@ -10319,7 +10884,7 @@
 </p:sld>
 </file>
 
-<file path=ppt/slides/slide21.xml><?xml version="1.0" encoding="utf-8"?>
+<file path=ppt/slides/slide24.xml><?xml version="1.0" encoding="utf-8"?>
 <p:sld xmlns:a="http://schemas.openxmlformats.org/drawingml/2006/main" xmlns:r="http://schemas.openxmlformats.org/officeDocument/2006/relationships" xmlns:p="http://schemas.openxmlformats.org/presentationml/2006/main">
   <p:cSld>
     <p:spTree>
@@ -10497,10 +11062,10 @@
                   </a:outerShdw>
                 </a:effectLst>
               </a:rPr>
-              <a:t> </a:t>
-            </a:r>
-            <a:r>
-              <a:rPr lang="en-US" sz="4800" b="1" smtClean="0">
+              <a:t> Bạn Và Thầy </a:t>
+            </a:r>
+            <a:r>
+              <a:rPr lang="en-US" sz="4800" b="1" dirty="0" err="1" smtClean="0">
                 <a:ln w="9525">
                   <a:solidFill>
                     <a:schemeClr val="bg1"/>
@@ -10519,10 +11084,10 @@
                   </a:outerShdw>
                 </a:effectLst>
               </a:rPr>
-              <a:t>Bạn Và Thầy </a:t>
-            </a:r>
-            <a:r>
-              <a:rPr lang="en-US" sz="4800" b="1" dirty="0" err="1" smtClean="0">
+              <a:t>Xem</a:t>
+            </a:r>
+            <a:r>
+              <a:rPr lang="en-US" sz="4800" b="1" dirty="0" smtClean="0">
                 <a:ln w="9525">
                   <a:solidFill>
                     <a:schemeClr val="bg1"/>
@@ -10541,10 +11106,10 @@
                   </a:outerShdw>
                 </a:effectLst>
               </a:rPr>
-              <a:t>Xem</a:t>
-            </a:r>
-            <a:r>
-              <a:rPr lang="en-US" sz="4800" b="1" dirty="0" smtClean="0">
+              <a:t> Demo </a:t>
+            </a:r>
+            <a:r>
+              <a:rPr lang="en-US" sz="4800" b="1" dirty="0" err="1" smtClean="0">
                 <a:ln w="9525">
                   <a:solidFill>
                     <a:schemeClr val="bg1"/>
@@ -10563,10 +11128,10 @@
                   </a:outerShdw>
                 </a:effectLst>
               </a:rPr>
-              <a:t> Demo </a:t>
-            </a:r>
-            <a:r>
-              <a:rPr lang="en-US" sz="4800" b="1" dirty="0" err="1" smtClean="0">
+              <a:t>Đồ</a:t>
+            </a:r>
+            <a:r>
+              <a:rPr lang="en-US" sz="4800" b="1" dirty="0" smtClean="0">
                 <a:ln w="9525">
                   <a:solidFill>
                     <a:schemeClr val="bg1"/>
@@ -10585,10 +11150,10 @@
                   </a:outerShdw>
                 </a:effectLst>
               </a:rPr>
-              <a:t>Đồ</a:t>
-            </a:r>
-            <a:r>
-              <a:rPr lang="en-US" sz="4800" b="1" dirty="0" smtClean="0">
+              <a:t> </a:t>
+            </a:r>
+            <a:r>
+              <a:rPr lang="en-US" sz="4800" b="1" dirty="0" err="1" smtClean="0">
                 <a:ln w="9525">
                   <a:solidFill>
                     <a:schemeClr val="bg1"/>
@@ -10607,10 +11172,10 @@
                   </a:outerShdw>
                 </a:effectLst>
               </a:rPr>
-              <a:t> </a:t>
-            </a:r>
-            <a:r>
-              <a:rPr lang="en-US" sz="4800" b="1" dirty="0" err="1" smtClean="0">
+              <a:t>Án</a:t>
+            </a:r>
+            <a:r>
+              <a:rPr lang="en-US" sz="4800" b="1" dirty="0" smtClean="0">
                 <a:ln w="9525">
                   <a:solidFill>
                     <a:schemeClr val="bg1"/>
@@ -10629,10 +11194,10 @@
                   </a:outerShdw>
                 </a:effectLst>
               </a:rPr>
-              <a:t>Án</a:t>
-            </a:r>
-            <a:r>
-              <a:rPr lang="en-US" sz="4800" b="1" dirty="0" smtClean="0">
+              <a:t> </a:t>
+            </a:r>
+            <a:r>
+              <a:rPr lang="en-US" sz="4800" b="1" err="1" smtClean="0">
                 <a:ln w="9525">
                   <a:solidFill>
                     <a:schemeClr val="bg1"/>
@@ -10651,10 +11216,10 @@
                   </a:outerShdw>
                 </a:effectLst>
               </a:rPr>
-              <a:t> </a:t>
-            </a:r>
-            <a:r>
-              <a:rPr lang="en-US" sz="4800" b="1" err="1" smtClean="0">
+              <a:t>Của</a:t>
+            </a:r>
+            <a:r>
+              <a:rPr lang="en-US" sz="4800" b="1" smtClean="0">
                 <a:ln w="9525">
                   <a:solidFill>
                     <a:schemeClr val="bg1"/>
@@ -10673,51 +11238,7 @@
                   </a:outerShdw>
                 </a:effectLst>
               </a:rPr>
-              <a:t>Của</a:t>
-            </a:r>
-            <a:r>
-              <a:rPr lang="en-US" sz="4800" b="1" smtClean="0">
-                <a:ln w="9525">
-                  <a:solidFill>
-                    <a:schemeClr val="bg1"/>
-                  </a:solidFill>
-                  <a:prstDash val="solid"/>
-                </a:ln>
-                <a:solidFill>
-                  <a:schemeClr val="accent5"/>
-                </a:solidFill>
-                <a:effectLst>
-                  <a:outerShdw blurRad="12700" dist="38100" dir="2700000" algn="tl" rotWithShape="0">
-                    <a:schemeClr val="accent5">
-                      <a:lumMod val="60000"/>
-                      <a:lumOff val="40000"/>
-                    </a:schemeClr>
-                  </a:outerShdw>
-                </a:effectLst>
-              </a:rPr>
-              <a:t> </a:t>
-            </a:r>
-            <a:r>
-              <a:rPr lang="en-US" sz="4800" b="1" smtClean="0">
-                <a:ln w="9525">
-                  <a:solidFill>
-                    <a:schemeClr val="bg1"/>
-                  </a:solidFill>
-                  <a:prstDash val="solid"/>
-                </a:ln>
-                <a:solidFill>
-                  <a:schemeClr val="accent5"/>
-                </a:solidFill>
-                <a:effectLst>
-                  <a:outerShdw blurRad="12700" dist="38100" dir="2700000" algn="tl" rotWithShape="0">
-                    <a:schemeClr val="accent5">
-                      <a:lumMod val="60000"/>
-                      <a:lumOff val="40000"/>
-                    </a:schemeClr>
-                  </a:outerShdw>
-                </a:effectLst>
-              </a:rPr>
-              <a:t>Nhóm</a:t>
+              <a:t> Nhóm</a:t>
             </a:r>
             <a:endParaRPr lang="en-US" sz="4800" b="1" dirty="0">
               <a:ln w="9525">
@@ -10761,7 +11282,7 @@
 </p:sld>
 </file>
 
-<file path=ppt/slides/slide22.xml><?xml version="1.0" encoding="utf-8"?>
+<file path=ppt/slides/slide25.xml><?xml version="1.0" encoding="utf-8"?>
 <p:sld xmlns:a="http://schemas.openxmlformats.org/drawingml/2006/main" xmlns:r="http://schemas.openxmlformats.org/officeDocument/2006/relationships" xmlns:p="http://schemas.openxmlformats.org/presentationml/2006/main">
   <p:cSld>
     <p:spTree>
@@ -12179,14 +12700,7 @@
                 <a:latin typeface="Times New Roman" panose="02020603050405020304" pitchFamily="18" charset="0"/>
                 <a:cs typeface="Times New Roman" panose="02020603050405020304" pitchFamily="18" charset="0"/>
               </a:rPr>
-              <a:t> </a:t>
-            </a:r>
-            <a:r>
-              <a:rPr lang="en-US" smtClean="0">
-                <a:latin typeface="Times New Roman" panose="02020603050405020304" pitchFamily="18" charset="0"/>
-                <a:cs typeface="Times New Roman" panose="02020603050405020304" pitchFamily="18" charset="0"/>
-              </a:rPr>
-              <a:t>bán điện </a:t>
+              <a:t> bán điện </a:t>
             </a:r>
             <a:r>
               <a:rPr lang="en-US" err="1" smtClean="0">
@@ -12715,35 +13229,21 @@
                 <a:latin typeface="Times New Roman" panose="02020603050405020304" pitchFamily="18" charset="0"/>
                 <a:cs typeface="Times New Roman" panose="02020603050405020304" pitchFamily="18" charset="0"/>
               </a:rPr>
-              <a:t> </a:t>
+              <a:t> tra, tìm kiếm </a:t>
+            </a:r>
+            <a:r>
+              <a:rPr lang="en-US" err="1" smtClean="0">
+                <a:latin typeface="Times New Roman" panose="02020603050405020304" pitchFamily="18" charset="0"/>
+                <a:cs typeface="Times New Roman" panose="02020603050405020304" pitchFamily="18" charset="0"/>
+              </a:rPr>
+              <a:t>kho</a:t>
             </a:r>
             <a:r>
               <a:rPr lang="en-US" smtClean="0">
                 <a:latin typeface="Times New Roman" panose="02020603050405020304" pitchFamily="18" charset="0"/>
                 <a:cs typeface="Times New Roman" panose="02020603050405020304" pitchFamily="18" charset="0"/>
               </a:rPr>
-              <a:t>tra, tìm kiếm </a:t>
-            </a:r>
-            <a:r>
-              <a:rPr lang="en-US" err="1" smtClean="0">
-                <a:latin typeface="Times New Roman" panose="02020603050405020304" pitchFamily="18" charset="0"/>
-                <a:cs typeface="Times New Roman" panose="02020603050405020304" pitchFamily="18" charset="0"/>
-              </a:rPr>
-              <a:t>kho</a:t>
-            </a:r>
-            <a:r>
-              <a:rPr lang="en-US" smtClean="0">
-                <a:latin typeface="Times New Roman" panose="02020603050405020304" pitchFamily="18" charset="0"/>
-                <a:cs typeface="Times New Roman" panose="02020603050405020304" pitchFamily="18" charset="0"/>
-              </a:rPr>
-              <a:t> </a:t>
-            </a:r>
-            <a:r>
-              <a:rPr lang="en-US" smtClean="0">
-                <a:latin typeface="Times New Roman" panose="02020603050405020304" pitchFamily="18" charset="0"/>
-                <a:cs typeface="Times New Roman" panose="02020603050405020304" pitchFamily="18" charset="0"/>
-              </a:rPr>
-              <a:t>hàng</a:t>
+              <a:t> hàng</a:t>
             </a:r>
             <a:endParaRPr lang="en-US" dirty="0" smtClean="0">
               <a:latin typeface="Times New Roman" panose="02020603050405020304" pitchFamily="18" charset="0"/>

</xml_diff>